<commit_message>
Milestone 1 Final Version
</commit_message>
<xml_diff>
--- a/ENSE 470 - Milestone 1.pptx
+++ b/ENSE 470 - Milestone 1.pptx
@@ -66,10 +66,10 @@
         </a:solidFill>
         <a:effectLst/>
         <a:uFillTx/>
-        <a:latin typeface="Arial"/>
-        <a:ea typeface="Arial"/>
-        <a:cs typeface="Arial"/>
-        <a:sym typeface="Arial"/>
+        <a:latin typeface="+mn-lt"/>
+        <a:ea typeface="+mn-ea"/>
+        <a:cs typeface="+mn-cs"/>
+        <a:sym typeface="Helvetica"/>
       </a:defRPr>
     </a:lvl1pPr>
     <a:lvl2pPr marL="0" marR="0" indent="0" algn="l" defTabSz="914400" rtl="0" fontAlgn="auto" latinLnBrk="0" hangingPunct="0">
@@ -96,10 +96,10 @@
         </a:solidFill>
         <a:effectLst/>
         <a:uFillTx/>
-        <a:latin typeface="Arial"/>
-        <a:ea typeface="Arial"/>
-        <a:cs typeface="Arial"/>
-        <a:sym typeface="Arial"/>
+        <a:latin typeface="+mn-lt"/>
+        <a:ea typeface="+mn-ea"/>
+        <a:cs typeface="+mn-cs"/>
+        <a:sym typeface="Helvetica"/>
       </a:defRPr>
     </a:lvl2pPr>
     <a:lvl3pPr marL="0" marR="0" indent="0" algn="l" defTabSz="914400" rtl="0" fontAlgn="auto" latinLnBrk="0" hangingPunct="0">
@@ -126,10 +126,10 @@
         </a:solidFill>
         <a:effectLst/>
         <a:uFillTx/>
-        <a:latin typeface="Arial"/>
-        <a:ea typeface="Arial"/>
-        <a:cs typeface="Arial"/>
-        <a:sym typeface="Arial"/>
+        <a:latin typeface="+mn-lt"/>
+        <a:ea typeface="+mn-ea"/>
+        <a:cs typeface="+mn-cs"/>
+        <a:sym typeface="Helvetica"/>
       </a:defRPr>
     </a:lvl3pPr>
     <a:lvl4pPr marL="0" marR="0" indent="0" algn="l" defTabSz="914400" rtl="0" fontAlgn="auto" latinLnBrk="0" hangingPunct="0">
@@ -156,10 +156,10 @@
         </a:solidFill>
         <a:effectLst/>
         <a:uFillTx/>
-        <a:latin typeface="Arial"/>
-        <a:ea typeface="Arial"/>
-        <a:cs typeface="Arial"/>
-        <a:sym typeface="Arial"/>
+        <a:latin typeface="+mn-lt"/>
+        <a:ea typeface="+mn-ea"/>
+        <a:cs typeface="+mn-cs"/>
+        <a:sym typeface="Helvetica"/>
       </a:defRPr>
     </a:lvl4pPr>
     <a:lvl5pPr marL="0" marR="0" indent="0" algn="l" defTabSz="914400" rtl="0" fontAlgn="auto" latinLnBrk="0" hangingPunct="0">
@@ -186,10 +186,10 @@
         </a:solidFill>
         <a:effectLst/>
         <a:uFillTx/>
-        <a:latin typeface="Arial"/>
-        <a:ea typeface="Arial"/>
-        <a:cs typeface="Arial"/>
-        <a:sym typeface="Arial"/>
+        <a:latin typeface="+mn-lt"/>
+        <a:ea typeface="+mn-ea"/>
+        <a:cs typeface="+mn-cs"/>
+        <a:sym typeface="Helvetica"/>
       </a:defRPr>
     </a:lvl5pPr>
     <a:lvl6pPr marL="0" marR="0" indent="0" algn="l" defTabSz="914400" rtl="0" fontAlgn="auto" latinLnBrk="0" hangingPunct="0">
@@ -216,10 +216,10 @@
         </a:solidFill>
         <a:effectLst/>
         <a:uFillTx/>
-        <a:latin typeface="Arial"/>
-        <a:ea typeface="Arial"/>
-        <a:cs typeface="Arial"/>
-        <a:sym typeface="Arial"/>
+        <a:latin typeface="+mn-lt"/>
+        <a:ea typeface="+mn-ea"/>
+        <a:cs typeface="+mn-cs"/>
+        <a:sym typeface="Helvetica"/>
       </a:defRPr>
     </a:lvl6pPr>
     <a:lvl7pPr marL="0" marR="0" indent="0" algn="l" defTabSz="914400" rtl="0" fontAlgn="auto" latinLnBrk="0" hangingPunct="0">
@@ -246,10 +246,10 @@
         </a:solidFill>
         <a:effectLst/>
         <a:uFillTx/>
-        <a:latin typeface="Arial"/>
-        <a:ea typeface="Arial"/>
-        <a:cs typeface="Arial"/>
-        <a:sym typeface="Arial"/>
+        <a:latin typeface="+mn-lt"/>
+        <a:ea typeface="+mn-ea"/>
+        <a:cs typeface="+mn-cs"/>
+        <a:sym typeface="Helvetica"/>
       </a:defRPr>
     </a:lvl7pPr>
     <a:lvl8pPr marL="0" marR="0" indent="0" algn="l" defTabSz="914400" rtl="0" fontAlgn="auto" latinLnBrk="0" hangingPunct="0">
@@ -276,10 +276,10 @@
         </a:solidFill>
         <a:effectLst/>
         <a:uFillTx/>
-        <a:latin typeface="Arial"/>
-        <a:ea typeface="Arial"/>
-        <a:cs typeface="Arial"/>
-        <a:sym typeface="Arial"/>
+        <a:latin typeface="+mn-lt"/>
+        <a:ea typeface="+mn-ea"/>
+        <a:cs typeface="+mn-cs"/>
+        <a:sym typeface="Helvetica"/>
       </a:defRPr>
     </a:lvl8pPr>
     <a:lvl9pPr marL="0" marR="0" indent="0" algn="l" defTabSz="914400" rtl="0" fontAlgn="auto" latinLnBrk="0" hangingPunct="0">
@@ -306,10 +306,10 @@
         </a:solidFill>
         <a:effectLst/>
         <a:uFillTx/>
-        <a:latin typeface="Arial"/>
-        <a:ea typeface="Arial"/>
-        <a:cs typeface="Arial"/>
-        <a:sym typeface="Arial"/>
+        <a:latin typeface="+mn-lt"/>
+        <a:ea typeface="+mn-ea"/>
+        <a:cs typeface="+mn-cs"/>
+        <a:sym typeface="Helvetica"/>
       </a:defRPr>
     </a:lvl9pPr>
   </p:defaultTextStyle>
@@ -499,10 +499,10 @@
         </p:nvGrpSpPr>
         <p:grpSpPr>
           <a:xfrm>
-            <a:off x="6098378" y="4"/>
-            <a:ext cx="3045626" cy="2030572"/>
-            <a:chOff x="0" y="0"/>
-            <a:chExt cx="3045625" cy="2030570"/>
+            <a:off x="6098377" y="3"/>
+            <a:ext cx="3045627" cy="2030575"/>
+            <a:chOff x="-1" y="0"/>
+            <a:chExt cx="3045626" cy="2030573"/>
           </a:xfrm>
         </p:grpSpPr>
         <p:sp>
@@ -514,7 +514,7 @@
           <p:spPr>
             <a:xfrm>
               <a:off x="2030424" y="10"/>
-              <a:ext cx="1015201" cy="1015202"/>
+              <a:ext cx="1015202" cy="1015203"/>
             </a:xfrm>
             <a:prstGeom prst="rect">
               <a:avLst/>
@@ -529,7 +529,7 @@
             <a:effectLst/>
           </p:spPr>
           <p:txBody>
-            <a:bodyPr wrap="square" lIns="45719" tIns="45719" rIns="45719" bIns="45719" numCol="1" anchor="ctr">
+            <a:bodyPr wrap="square" lIns="45718" tIns="45718" rIns="45718" bIns="45718" numCol="1" anchor="ctr">
               <a:noAutofit/>
             </a:bodyPr>
             <a:lstStyle/>
@@ -539,6 +539,10 @@
                   <a:solidFill>
                     <a:srgbClr val="000000"/>
                   </a:solidFill>
+                  <a:latin typeface="Arial"/>
+                  <a:ea typeface="Arial"/>
+                  <a:cs typeface="Arial"/>
+                  <a:sym typeface="Arial"/>
                 </a:defRPr>
               </a:pPr>
             </a:p>
@@ -553,7 +557,7 @@
           <p:spPr>
             <a:xfrm flipH="1">
               <a:off x="1015084" y="-1"/>
-              <a:ext cx="1015202" cy="1015202"/>
+              <a:ext cx="1015203" cy="1015204"/>
             </a:xfrm>
             <a:custGeom>
               <a:avLst/>
@@ -599,7 +603,7 @@
             <a:effectLst/>
           </p:spPr>
           <p:txBody>
-            <a:bodyPr wrap="square" lIns="45719" tIns="45719" rIns="45719" bIns="45719" numCol="1" anchor="ctr">
+            <a:bodyPr wrap="square" lIns="45718" tIns="45718" rIns="45718" bIns="45718" numCol="1" anchor="ctr">
               <a:noAutofit/>
             </a:bodyPr>
             <a:lstStyle/>
@@ -609,6 +613,10 @@
                   <a:solidFill>
                     <a:srgbClr val="000000"/>
                   </a:solidFill>
+                  <a:latin typeface="Arial"/>
+                  <a:ea typeface="Arial"/>
+                  <a:cs typeface="Arial"/>
+                  <a:sym typeface="Arial"/>
                 </a:defRPr>
               </a:pPr>
             </a:p>
@@ -623,7 +631,7 @@
           <p:spPr>
             <a:xfrm flipH="1" rot="10800000">
               <a:off x="1015209" y="102"/>
-              <a:ext cx="1015201" cy="1015201"/>
+              <a:ext cx="1015202" cy="1015203"/>
             </a:xfrm>
             <a:custGeom>
               <a:avLst/>
@@ -669,7 +677,7 @@
             <a:effectLst/>
           </p:spPr>
           <p:txBody>
-            <a:bodyPr wrap="square" lIns="45719" tIns="45719" rIns="45719" bIns="45719" numCol="1" anchor="ctr">
+            <a:bodyPr wrap="square" lIns="45718" tIns="45718" rIns="45718" bIns="45718" numCol="1" anchor="ctr">
               <a:noAutofit/>
             </a:bodyPr>
             <a:lstStyle/>
@@ -679,6 +687,10 @@
                   <a:solidFill>
                     <a:srgbClr val="000000"/>
                   </a:solidFill>
+                  <a:latin typeface="Arial"/>
+                  <a:ea typeface="Arial"/>
+                  <a:cs typeface="Arial"/>
+                  <a:sym typeface="Arial"/>
                 </a:defRPr>
               </a:pPr>
             </a:p>
@@ -693,7 +705,7 @@
           <p:spPr>
             <a:xfrm rot="10800000">
               <a:off x="-1" y="92"/>
-              <a:ext cx="1015202" cy="1015201"/>
+              <a:ext cx="1015203" cy="1015203"/>
             </a:xfrm>
             <a:custGeom>
               <a:avLst/>
@@ -739,7 +751,7 @@
             <a:effectLst/>
           </p:spPr>
           <p:txBody>
-            <a:bodyPr wrap="square" lIns="45719" tIns="45719" rIns="45719" bIns="45719" numCol="1" anchor="ctr">
+            <a:bodyPr wrap="square" lIns="45718" tIns="45718" rIns="45718" bIns="45718" numCol="1" anchor="ctr">
               <a:noAutofit/>
             </a:bodyPr>
             <a:lstStyle/>
@@ -749,6 +761,10 @@
                   <a:solidFill>
                     <a:srgbClr val="000000"/>
                   </a:solidFill>
+                  <a:latin typeface="Arial"/>
+                  <a:ea typeface="Arial"/>
+                  <a:cs typeface="Arial"/>
+                  <a:sym typeface="Arial"/>
                 </a:defRPr>
               </a:pPr>
             </a:p>
@@ -763,7 +779,7 @@
           <p:spPr>
             <a:xfrm rot="10800000">
               <a:off x="2030410" y="1015370"/>
-              <a:ext cx="1015202" cy="1015201"/>
+              <a:ext cx="1015203" cy="1015203"/>
             </a:xfrm>
             <a:custGeom>
               <a:avLst/>
@@ -809,7 +825,7 @@
             <a:effectLst/>
           </p:spPr>
           <p:txBody>
-            <a:bodyPr wrap="square" lIns="45719" tIns="45719" rIns="45719" bIns="45719" numCol="1" anchor="ctr">
+            <a:bodyPr wrap="square" lIns="45718" tIns="45718" rIns="45718" bIns="45718" numCol="1" anchor="ctr">
               <a:noAutofit/>
             </a:bodyPr>
             <a:lstStyle/>
@@ -819,6 +835,10 @@
                   <a:solidFill>
                     <a:srgbClr val="000000"/>
                   </a:solidFill>
+                  <a:latin typeface="Arial"/>
+                  <a:ea typeface="Arial"/>
+                  <a:cs typeface="Arial"/>
+                  <a:sym typeface="Arial"/>
                 </a:defRPr>
               </a:pPr>
             </a:p>
@@ -836,7 +856,7 @@
         <p:spPr>
           <a:xfrm>
             <a:off x="598100" y="1775222"/>
-            <a:ext cx="8222100" cy="838801"/>
+            <a:ext cx="8222100" cy="838802"/>
           </a:xfrm>
           <a:prstGeom prst="rect">
             <a:avLst/>
@@ -871,8 +891,8 @@
         </p:nvSpPr>
         <p:spPr>
           <a:xfrm>
-            <a:off x="598088" y="2715912"/>
-            <a:ext cx="8222100" cy="432901"/>
+            <a:off x="598088" y="2715911"/>
+            <a:ext cx="8222100" cy="432902"/>
           </a:xfrm>
           <a:prstGeom prst="rect">
             <a:avLst/>
@@ -881,7 +901,7 @@
         <p:txBody>
           <a:bodyPr/>
           <a:lstStyle>
-            <a:lvl1pPr marL="342900" indent="-228600">
+            <a:lvl1pPr marL="228600" indent="-114300">
               <a:lnSpc>
                 <a:spcPct val="100000"/>
               </a:lnSpc>
@@ -895,7 +915,7 @@
                 </a:solidFill>
               </a:defRPr>
             </a:lvl1pPr>
-            <a:lvl2pPr marL="342900" indent="254000">
+            <a:lvl2pPr marL="228600" indent="114300">
               <a:lnSpc>
                 <a:spcPct val="100000"/>
               </a:lnSpc>
@@ -909,7 +929,7 @@
                 </a:solidFill>
               </a:defRPr>
             </a:lvl2pPr>
-            <a:lvl3pPr marL="342900" indent="711200">
+            <a:lvl3pPr marL="228600" indent="114300">
               <a:lnSpc>
                 <a:spcPct val="100000"/>
               </a:lnSpc>
@@ -923,7 +943,7 @@
                 </a:solidFill>
               </a:defRPr>
             </a:lvl3pPr>
-            <a:lvl4pPr marL="342900" indent="1168400">
+            <a:lvl4pPr marL="228600" indent="114300">
               <a:lnSpc>
                 <a:spcPct val="100000"/>
               </a:lnSpc>
@@ -937,7 +957,7 @@
                 </a:solidFill>
               </a:defRPr>
             </a:lvl4pPr>
-            <a:lvl5pPr marL="342900" indent="1625600">
+            <a:lvl5pPr marL="228600" indent="114300">
               <a:lnSpc>
                 <a:spcPct val="100000"/>
               </a:lnSpc>
@@ -1047,10 +1067,10 @@
         </p:nvGrpSpPr>
         <p:grpSpPr>
           <a:xfrm>
-            <a:off x="6098378" y="4"/>
-            <a:ext cx="3045626" cy="2030572"/>
-            <a:chOff x="0" y="0"/>
-            <a:chExt cx="3045625" cy="2030570"/>
+            <a:off x="6098377" y="3"/>
+            <a:ext cx="3045627" cy="2030575"/>
+            <a:chOff x="-1" y="0"/>
+            <a:chExt cx="3045626" cy="2030573"/>
           </a:xfrm>
         </p:grpSpPr>
         <p:sp>
@@ -1062,7 +1082,7 @@
           <p:spPr>
             <a:xfrm>
               <a:off x="2030424" y="10"/>
-              <a:ext cx="1015201" cy="1015202"/>
+              <a:ext cx="1015202" cy="1015203"/>
             </a:xfrm>
             <a:prstGeom prst="rect">
               <a:avLst/>
@@ -1077,7 +1097,7 @@
             <a:effectLst/>
           </p:spPr>
           <p:txBody>
-            <a:bodyPr wrap="square" lIns="45719" tIns="45719" rIns="45719" bIns="45719" numCol="1" anchor="ctr">
+            <a:bodyPr wrap="square" lIns="45718" tIns="45718" rIns="45718" bIns="45718" numCol="1" anchor="ctr">
               <a:noAutofit/>
             </a:bodyPr>
             <a:lstStyle/>
@@ -1087,6 +1107,10 @@
                   <a:solidFill>
                     <a:srgbClr val="000000"/>
                   </a:solidFill>
+                  <a:latin typeface="Arial"/>
+                  <a:ea typeface="Arial"/>
+                  <a:cs typeface="Arial"/>
+                  <a:sym typeface="Arial"/>
                 </a:defRPr>
               </a:pPr>
             </a:p>
@@ -1101,7 +1125,7 @@
           <p:spPr>
             <a:xfrm flipH="1">
               <a:off x="1015084" y="-1"/>
-              <a:ext cx="1015202" cy="1015202"/>
+              <a:ext cx="1015203" cy="1015204"/>
             </a:xfrm>
             <a:custGeom>
               <a:avLst/>
@@ -1147,7 +1171,7 @@
             <a:effectLst/>
           </p:spPr>
           <p:txBody>
-            <a:bodyPr wrap="square" lIns="45719" tIns="45719" rIns="45719" bIns="45719" numCol="1" anchor="ctr">
+            <a:bodyPr wrap="square" lIns="45718" tIns="45718" rIns="45718" bIns="45718" numCol="1" anchor="ctr">
               <a:noAutofit/>
             </a:bodyPr>
             <a:lstStyle/>
@@ -1157,6 +1181,10 @@
                   <a:solidFill>
                     <a:srgbClr val="000000"/>
                   </a:solidFill>
+                  <a:latin typeface="Arial"/>
+                  <a:ea typeface="Arial"/>
+                  <a:cs typeface="Arial"/>
+                  <a:sym typeface="Arial"/>
                 </a:defRPr>
               </a:pPr>
             </a:p>
@@ -1171,7 +1199,7 @@
           <p:spPr>
             <a:xfrm flipH="1" rot="10800000">
               <a:off x="1015209" y="102"/>
-              <a:ext cx="1015201" cy="1015201"/>
+              <a:ext cx="1015202" cy="1015203"/>
             </a:xfrm>
             <a:custGeom>
               <a:avLst/>
@@ -1217,7 +1245,7 @@
             <a:effectLst/>
           </p:spPr>
           <p:txBody>
-            <a:bodyPr wrap="square" lIns="45719" tIns="45719" rIns="45719" bIns="45719" numCol="1" anchor="ctr">
+            <a:bodyPr wrap="square" lIns="45718" tIns="45718" rIns="45718" bIns="45718" numCol="1" anchor="ctr">
               <a:noAutofit/>
             </a:bodyPr>
             <a:lstStyle/>
@@ -1227,6 +1255,10 @@
                   <a:solidFill>
                     <a:srgbClr val="000000"/>
                   </a:solidFill>
+                  <a:latin typeface="Arial"/>
+                  <a:ea typeface="Arial"/>
+                  <a:cs typeface="Arial"/>
+                  <a:sym typeface="Arial"/>
                 </a:defRPr>
               </a:pPr>
             </a:p>
@@ -1241,7 +1273,7 @@
           <p:spPr>
             <a:xfrm rot="10800000">
               <a:off x="-1" y="92"/>
-              <a:ext cx="1015202" cy="1015201"/>
+              <a:ext cx="1015203" cy="1015203"/>
             </a:xfrm>
             <a:custGeom>
               <a:avLst/>
@@ -1287,7 +1319,7 @@
             <a:effectLst/>
           </p:spPr>
           <p:txBody>
-            <a:bodyPr wrap="square" lIns="45719" tIns="45719" rIns="45719" bIns="45719" numCol="1" anchor="ctr">
+            <a:bodyPr wrap="square" lIns="45718" tIns="45718" rIns="45718" bIns="45718" numCol="1" anchor="ctr">
               <a:noAutofit/>
             </a:bodyPr>
             <a:lstStyle/>
@@ -1297,6 +1329,10 @@
                   <a:solidFill>
                     <a:srgbClr val="000000"/>
                   </a:solidFill>
+                  <a:latin typeface="Arial"/>
+                  <a:ea typeface="Arial"/>
+                  <a:cs typeface="Arial"/>
+                  <a:sym typeface="Arial"/>
                 </a:defRPr>
               </a:pPr>
             </a:p>
@@ -1311,7 +1347,7 @@
           <p:spPr>
             <a:xfrm rot="10800000">
               <a:off x="2030410" y="1015370"/>
-              <a:ext cx="1015202" cy="1015201"/>
+              <a:ext cx="1015203" cy="1015203"/>
             </a:xfrm>
             <a:custGeom>
               <a:avLst/>
@@ -1357,7 +1393,7 @@
             <a:effectLst/>
           </p:spPr>
           <p:txBody>
-            <a:bodyPr wrap="square" lIns="45719" tIns="45719" rIns="45719" bIns="45719" numCol="1" anchor="ctr">
+            <a:bodyPr wrap="square" lIns="45718" tIns="45718" rIns="45718" bIns="45718" numCol="1" anchor="ctr">
               <a:noAutofit/>
             </a:bodyPr>
             <a:lstStyle/>
@@ -1367,6 +1403,10 @@
                   <a:solidFill>
                     <a:srgbClr val="000000"/>
                   </a:solidFill>
+                  <a:latin typeface="Arial"/>
+                  <a:ea typeface="Arial"/>
+                  <a:cs typeface="Arial"/>
+                  <a:sym typeface="Arial"/>
                 </a:defRPr>
               </a:pPr>
             </a:p>
@@ -1383,8 +1423,8 @@
         </p:nvSpPr>
         <p:spPr>
           <a:xfrm>
-            <a:off x="311699" y="1256049"/>
-            <a:ext cx="8520602" cy="2030702"/>
+            <a:off x="311698" y="1256049"/>
+            <a:ext cx="8520603" cy="2030703"/>
           </a:xfrm>
           <a:prstGeom prst="rect">
             <a:avLst/>
@@ -1419,8 +1459,8 @@
         </p:nvSpPr>
         <p:spPr>
           <a:xfrm>
-            <a:off x="311699" y="3369224"/>
-            <a:ext cx="8520602" cy="1281901"/>
+            <a:off x="311698" y="3369224"/>
+            <a:ext cx="8520603" cy="1281902"/>
           </a:xfrm>
           <a:prstGeom prst="rect">
             <a:avLst/>
@@ -1631,10 +1671,10 @@
         </p:nvGrpSpPr>
         <p:grpSpPr>
           <a:xfrm>
-            <a:off x="6098378" y="4"/>
-            <a:ext cx="3045626" cy="2030572"/>
-            <a:chOff x="0" y="0"/>
-            <a:chExt cx="3045625" cy="2030570"/>
+            <a:off x="6098377" y="3"/>
+            <a:ext cx="3045627" cy="2030575"/>
+            <a:chOff x="-1" y="0"/>
+            <a:chExt cx="3045626" cy="2030573"/>
           </a:xfrm>
         </p:grpSpPr>
         <p:sp>
@@ -1646,7 +1686,7 @@
           <p:spPr>
             <a:xfrm>
               <a:off x="2030424" y="10"/>
-              <a:ext cx="1015201" cy="1015202"/>
+              <a:ext cx="1015202" cy="1015203"/>
             </a:xfrm>
             <a:prstGeom prst="rect">
               <a:avLst/>
@@ -1661,7 +1701,7 @@
             <a:effectLst/>
           </p:spPr>
           <p:txBody>
-            <a:bodyPr wrap="square" lIns="45719" tIns="45719" rIns="45719" bIns="45719" numCol="1" anchor="ctr">
+            <a:bodyPr wrap="square" lIns="45718" tIns="45718" rIns="45718" bIns="45718" numCol="1" anchor="ctr">
               <a:noAutofit/>
             </a:bodyPr>
             <a:lstStyle/>
@@ -1671,6 +1711,10 @@
                   <a:solidFill>
                     <a:srgbClr val="000000"/>
                   </a:solidFill>
+                  <a:latin typeface="Arial"/>
+                  <a:ea typeface="Arial"/>
+                  <a:cs typeface="Arial"/>
+                  <a:sym typeface="Arial"/>
                 </a:defRPr>
               </a:pPr>
             </a:p>
@@ -1685,7 +1729,7 @@
           <p:spPr>
             <a:xfrm flipH="1">
               <a:off x="1015084" y="-1"/>
-              <a:ext cx="1015202" cy="1015202"/>
+              <a:ext cx="1015203" cy="1015204"/>
             </a:xfrm>
             <a:custGeom>
               <a:avLst/>
@@ -1731,7 +1775,7 @@
             <a:effectLst/>
           </p:spPr>
           <p:txBody>
-            <a:bodyPr wrap="square" lIns="45719" tIns="45719" rIns="45719" bIns="45719" numCol="1" anchor="ctr">
+            <a:bodyPr wrap="square" lIns="45718" tIns="45718" rIns="45718" bIns="45718" numCol="1" anchor="ctr">
               <a:noAutofit/>
             </a:bodyPr>
             <a:lstStyle/>
@@ -1741,6 +1785,10 @@
                   <a:solidFill>
                     <a:srgbClr val="000000"/>
                   </a:solidFill>
+                  <a:latin typeface="Arial"/>
+                  <a:ea typeface="Arial"/>
+                  <a:cs typeface="Arial"/>
+                  <a:sym typeface="Arial"/>
                 </a:defRPr>
               </a:pPr>
             </a:p>
@@ -1755,7 +1803,7 @@
           <p:spPr>
             <a:xfrm flipH="1" rot="10800000">
               <a:off x="1015209" y="102"/>
-              <a:ext cx="1015201" cy="1015201"/>
+              <a:ext cx="1015202" cy="1015203"/>
             </a:xfrm>
             <a:custGeom>
               <a:avLst/>
@@ -1801,7 +1849,7 @@
             <a:effectLst/>
           </p:spPr>
           <p:txBody>
-            <a:bodyPr wrap="square" lIns="45719" tIns="45719" rIns="45719" bIns="45719" numCol="1" anchor="ctr">
+            <a:bodyPr wrap="square" lIns="45718" tIns="45718" rIns="45718" bIns="45718" numCol="1" anchor="ctr">
               <a:noAutofit/>
             </a:bodyPr>
             <a:lstStyle/>
@@ -1811,6 +1859,10 @@
                   <a:solidFill>
                     <a:srgbClr val="000000"/>
                   </a:solidFill>
+                  <a:latin typeface="Arial"/>
+                  <a:ea typeface="Arial"/>
+                  <a:cs typeface="Arial"/>
+                  <a:sym typeface="Arial"/>
                 </a:defRPr>
               </a:pPr>
             </a:p>
@@ -1825,7 +1877,7 @@
           <p:spPr>
             <a:xfrm rot="10800000">
               <a:off x="-1" y="92"/>
-              <a:ext cx="1015202" cy="1015201"/>
+              <a:ext cx="1015203" cy="1015203"/>
             </a:xfrm>
             <a:custGeom>
               <a:avLst/>
@@ -1871,7 +1923,7 @@
             <a:effectLst/>
           </p:spPr>
           <p:txBody>
-            <a:bodyPr wrap="square" lIns="45719" tIns="45719" rIns="45719" bIns="45719" numCol="1" anchor="ctr">
+            <a:bodyPr wrap="square" lIns="45718" tIns="45718" rIns="45718" bIns="45718" numCol="1" anchor="ctr">
               <a:noAutofit/>
             </a:bodyPr>
             <a:lstStyle/>
@@ -1881,6 +1933,10 @@
                   <a:solidFill>
                     <a:srgbClr val="000000"/>
                   </a:solidFill>
+                  <a:latin typeface="Arial"/>
+                  <a:ea typeface="Arial"/>
+                  <a:cs typeface="Arial"/>
+                  <a:sym typeface="Arial"/>
                 </a:defRPr>
               </a:pPr>
             </a:p>
@@ -1895,7 +1951,7 @@
           <p:spPr>
             <a:xfrm rot="10800000">
               <a:off x="2030410" y="1015370"/>
-              <a:ext cx="1015202" cy="1015201"/>
+              <a:ext cx="1015203" cy="1015203"/>
             </a:xfrm>
             <a:custGeom>
               <a:avLst/>
@@ -1941,7 +1997,7 @@
             <a:effectLst/>
           </p:spPr>
           <p:txBody>
-            <a:bodyPr wrap="square" lIns="45719" tIns="45719" rIns="45719" bIns="45719" numCol="1" anchor="ctr">
+            <a:bodyPr wrap="square" lIns="45718" tIns="45718" rIns="45718" bIns="45718" numCol="1" anchor="ctr">
               <a:noAutofit/>
             </a:bodyPr>
             <a:lstStyle/>
@@ -1951,6 +2007,10 @@
                   <a:solidFill>
                     <a:srgbClr val="000000"/>
                   </a:solidFill>
+                  <a:latin typeface="Arial"/>
+                  <a:ea typeface="Arial"/>
+                  <a:cs typeface="Arial"/>
+                  <a:sym typeface="Arial"/>
                 </a:defRPr>
               </a:pPr>
             </a:p>
@@ -1967,8 +2027,8 @@
         </p:nvSpPr>
         <p:spPr>
           <a:xfrm>
-            <a:off x="598100" y="2152346"/>
-            <a:ext cx="8222100" cy="838801"/>
+            <a:off x="598100" y="2152345"/>
+            <a:ext cx="8222100" cy="838802"/>
           </a:xfrm>
           <a:prstGeom prst="rect">
             <a:avLst/>
@@ -2195,8 +2255,8 @@
         </p:nvSpPr>
         <p:spPr>
           <a:xfrm>
-            <a:off x="311699" y="1229975"/>
-            <a:ext cx="3999902" cy="3339001"/>
+            <a:off x="311698" y="1229975"/>
+            <a:ext cx="3999903" cy="3339001"/>
           </a:xfrm>
           <a:prstGeom prst="rect">
             <a:avLst/>
@@ -2268,8 +2328,8 @@
         </p:nvSpPr>
         <p:spPr>
           <a:xfrm>
-            <a:off x="4832399" y="1229974"/>
-            <a:ext cx="3999902" cy="3339002"/>
+            <a:off x="4832398" y="1229973"/>
+            <a:ext cx="3999903" cy="3339003"/>
           </a:xfrm>
           <a:prstGeom prst="rect">
             <a:avLst/>
@@ -2279,10 +2339,7 @@
           <a:bodyPr/>
           <a:lstStyle/>
           <a:p>
-            <a:pPr indent="-317500">
-              <a:buSzPts val="1400"/>
-              <a:defRPr sz="1400"/>
-            </a:pPr>
+            <a:pPr/>
           </a:p>
         </p:txBody>
       </p:sp>
@@ -2432,8 +2489,8 @@
         </p:nvSpPr>
         <p:spPr>
           <a:xfrm>
-            <a:off x="311699" y="555600"/>
-            <a:ext cx="2808001" cy="755700"/>
+            <a:off x="311698" y="555600"/>
+            <a:ext cx="2808003" cy="755700"/>
           </a:xfrm>
           <a:prstGeom prst="rect">
             <a:avLst/>
@@ -2464,8 +2521,8 @@
         </p:nvSpPr>
         <p:spPr>
           <a:xfrm>
-            <a:off x="311699" y="1465804"/>
-            <a:ext cx="2808001" cy="3103200"/>
+            <a:off x="311698" y="1465804"/>
+            <a:ext cx="2808003" cy="3103200"/>
           </a:xfrm>
           <a:prstGeom prst="rect">
             <a:avLst/>
@@ -2598,10 +2655,10 @@
         </p:nvGrpSpPr>
         <p:grpSpPr>
           <a:xfrm>
-            <a:off x="6098378" y="4"/>
-            <a:ext cx="3045626" cy="2030572"/>
-            <a:chOff x="0" y="0"/>
-            <a:chExt cx="3045625" cy="2030570"/>
+            <a:off x="6098377" y="3"/>
+            <a:ext cx="3045627" cy="2030575"/>
+            <a:chOff x="-1" y="0"/>
+            <a:chExt cx="3045626" cy="2030573"/>
           </a:xfrm>
         </p:grpSpPr>
         <p:sp>
@@ -2613,7 +2670,7 @@
           <p:spPr>
             <a:xfrm>
               <a:off x="2030424" y="10"/>
-              <a:ext cx="1015201" cy="1015202"/>
+              <a:ext cx="1015202" cy="1015203"/>
             </a:xfrm>
             <a:prstGeom prst="rect">
               <a:avLst/>
@@ -2628,7 +2685,7 @@
             <a:effectLst/>
           </p:spPr>
           <p:txBody>
-            <a:bodyPr wrap="square" lIns="45719" tIns="45719" rIns="45719" bIns="45719" numCol="1" anchor="ctr">
+            <a:bodyPr wrap="square" lIns="45718" tIns="45718" rIns="45718" bIns="45718" numCol="1" anchor="ctr">
               <a:noAutofit/>
             </a:bodyPr>
             <a:lstStyle/>
@@ -2638,6 +2695,10 @@
                   <a:solidFill>
                     <a:srgbClr val="000000"/>
                   </a:solidFill>
+                  <a:latin typeface="Arial"/>
+                  <a:ea typeface="Arial"/>
+                  <a:cs typeface="Arial"/>
+                  <a:sym typeface="Arial"/>
                 </a:defRPr>
               </a:pPr>
             </a:p>
@@ -2652,7 +2713,7 @@
           <p:spPr>
             <a:xfrm flipH="1">
               <a:off x="1015084" y="-1"/>
-              <a:ext cx="1015202" cy="1015202"/>
+              <a:ext cx="1015203" cy="1015204"/>
             </a:xfrm>
             <a:custGeom>
               <a:avLst/>
@@ -2698,7 +2759,7 @@
             <a:effectLst/>
           </p:spPr>
           <p:txBody>
-            <a:bodyPr wrap="square" lIns="45719" tIns="45719" rIns="45719" bIns="45719" numCol="1" anchor="ctr">
+            <a:bodyPr wrap="square" lIns="45718" tIns="45718" rIns="45718" bIns="45718" numCol="1" anchor="ctr">
               <a:noAutofit/>
             </a:bodyPr>
             <a:lstStyle/>
@@ -2708,6 +2769,10 @@
                   <a:solidFill>
                     <a:srgbClr val="000000"/>
                   </a:solidFill>
+                  <a:latin typeface="Arial"/>
+                  <a:ea typeface="Arial"/>
+                  <a:cs typeface="Arial"/>
+                  <a:sym typeface="Arial"/>
                 </a:defRPr>
               </a:pPr>
             </a:p>
@@ -2722,7 +2787,7 @@
           <p:spPr>
             <a:xfrm flipH="1" rot="10800000">
               <a:off x="1015209" y="102"/>
-              <a:ext cx="1015201" cy="1015201"/>
+              <a:ext cx="1015202" cy="1015203"/>
             </a:xfrm>
             <a:custGeom>
               <a:avLst/>
@@ -2768,7 +2833,7 @@
             <a:effectLst/>
           </p:spPr>
           <p:txBody>
-            <a:bodyPr wrap="square" lIns="45719" tIns="45719" rIns="45719" bIns="45719" numCol="1" anchor="ctr">
+            <a:bodyPr wrap="square" lIns="45718" tIns="45718" rIns="45718" bIns="45718" numCol="1" anchor="ctr">
               <a:noAutofit/>
             </a:bodyPr>
             <a:lstStyle/>
@@ -2778,6 +2843,10 @@
                   <a:solidFill>
                     <a:srgbClr val="000000"/>
                   </a:solidFill>
+                  <a:latin typeface="Arial"/>
+                  <a:ea typeface="Arial"/>
+                  <a:cs typeface="Arial"/>
+                  <a:sym typeface="Arial"/>
                 </a:defRPr>
               </a:pPr>
             </a:p>
@@ -2792,7 +2861,7 @@
           <p:spPr>
             <a:xfrm rot="10800000">
               <a:off x="-1" y="92"/>
-              <a:ext cx="1015202" cy="1015201"/>
+              <a:ext cx="1015203" cy="1015203"/>
             </a:xfrm>
             <a:custGeom>
               <a:avLst/>
@@ -2838,7 +2907,7 @@
             <a:effectLst/>
           </p:spPr>
           <p:txBody>
-            <a:bodyPr wrap="square" lIns="45719" tIns="45719" rIns="45719" bIns="45719" numCol="1" anchor="ctr">
+            <a:bodyPr wrap="square" lIns="45718" tIns="45718" rIns="45718" bIns="45718" numCol="1" anchor="ctr">
               <a:noAutofit/>
             </a:bodyPr>
             <a:lstStyle/>
@@ -2848,6 +2917,10 @@
                   <a:solidFill>
                     <a:srgbClr val="000000"/>
                   </a:solidFill>
+                  <a:latin typeface="Arial"/>
+                  <a:ea typeface="Arial"/>
+                  <a:cs typeface="Arial"/>
+                  <a:sym typeface="Arial"/>
                 </a:defRPr>
               </a:pPr>
             </a:p>
@@ -2862,7 +2935,7 @@
           <p:spPr>
             <a:xfrm rot="10800000">
               <a:off x="2030410" y="1015370"/>
-              <a:ext cx="1015202" cy="1015201"/>
+              <a:ext cx="1015203" cy="1015203"/>
             </a:xfrm>
             <a:custGeom>
               <a:avLst/>
@@ -2908,7 +2981,7 @@
             <a:effectLst/>
           </p:spPr>
           <p:txBody>
-            <a:bodyPr wrap="square" lIns="45719" tIns="45719" rIns="45719" bIns="45719" numCol="1" anchor="ctr">
+            <a:bodyPr wrap="square" lIns="45718" tIns="45718" rIns="45718" bIns="45718" numCol="1" anchor="ctr">
               <a:noAutofit/>
             </a:bodyPr>
             <a:lstStyle/>
@@ -2918,6 +2991,10 @@
                   <a:solidFill>
                     <a:srgbClr val="000000"/>
                   </a:solidFill>
+                  <a:latin typeface="Arial"/>
+                  <a:ea typeface="Arial"/>
+                  <a:cs typeface="Arial"/>
+                  <a:sym typeface="Arial"/>
                 </a:defRPr>
               </a:pPr>
             </a:p>
@@ -2934,8 +3011,8 @@
         </p:nvSpPr>
         <p:spPr>
           <a:xfrm>
-            <a:off x="490250" y="526349"/>
-            <a:ext cx="5618701" cy="4090801"/>
+            <a:off x="490250" y="526348"/>
+            <a:ext cx="5618701" cy="4090803"/>
           </a:xfrm>
           <a:prstGeom prst="rect">
             <a:avLst/>
@@ -3016,8 +3093,8 @@
         </p:nvSpPr>
         <p:spPr>
           <a:xfrm>
-            <a:off x="4572000" y="-175"/>
-            <a:ext cx="4572000" cy="5143501"/>
+            <a:off x="4572000" y="-176"/>
+            <a:ext cx="4572000" cy="5143503"/>
           </a:xfrm>
           <a:prstGeom prst="rect">
             <a:avLst/>
@@ -3030,7 +3107,7 @@
           </a:ln>
         </p:spPr>
         <p:txBody>
-          <a:bodyPr lIns="45719" rIns="45719" anchor="ctr"/>
+          <a:bodyPr lIns="45718" tIns="45718" rIns="45718" bIns="45718" anchor="ctr"/>
           <a:lstStyle/>
           <a:p>
             <a:pPr>
@@ -3038,6 +3115,10 @@
                 <a:solidFill>
                   <a:srgbClr val="000000"/>
                 </a:solidFill>
+                <a:latin typeface="Arial"/>
+                <a:ea typeface="Arial"/>
+                <a:cs typeface="Arial"/>
+                <a:sym typeface="Arial"/>
               </a:defRPr>
             </a:pPr>
           </a:p>
@@ -3052,7 +3133,7 @@
         <p:spPr>
           <a:xfrm>
             <a:off x="5029675" y="4495500"/>
-            <a:ext cx="468301" cy="1"/>
+            <a:ext cx="468302" cy="2"/>
           </a:xfrm>
           <a:prstGeom prst="line">
             <a:avLst/>
@@ -3064,7 +3145,7 @@
           </a:ln>
         </p:spPr>
         <p:txBody>
-          <a:bodyPr lIns="45719" rIns="45719"/>
+          <a:bodyPr lIns="45718" tIns="45718" rIns="45718" bIns="45718"/>
           <a:lstStyle/>
           <a:p>
             <a:pPr/>
@@ -3082,7 +3163,7 @@
         <p:spPr>
           <a:xfrm>
             <a:off x="265500" y="1151099"/>
-            <a:ext cx="4045200" cy="1564502"/>
+            <a:ext cx="4045200" cy="1564503"/>
           </a:xfrm>
           <a:prstGeom prst="rect">
             <a:avLst/>
@@ -3113,8 +3194,8 @@
         </p:nvSpPr>
         <p:spPr>
           <a:xfrm>
-            <a:off x="265500" y="2769000"/>
-            <a:ext cx="4045200" cy="1269301"/>
+            <a:off x="265500" y="2768999"/>
+            <a:ext cx="4045200" cy="1269302"/>
           </a:xfrm>
           <a:prstGeom prst="rect">
             <a:avLst/>
@@ -3123,7 +3204,7 @@
         <p:txBody>
           <a:bodyPr/>
           <a:lstStyle>
-            <a:lvl1pPr marL="342900" indent="-228600" algn="ctr">
+            <a:lvl1pPr marL="228600" indent="-114300" algn="ctr">
               <a:lnSpc>
                 <a:spcPct val="100000"/>
               </a:lnSpc>
@@ -3133,7 +3214,7 @@
               <a:buNone/>
               <a:defRPr sz="2100"/>
             </a:lvl1pPr>
-            <a:lvl2pPr marL="342900" indent="254000" algn="ctr">
+            <a:lvl2pPr marL="228600" indent="114300" algn="ctr">
               <a:lnSpc>
                 <a:spcPct val="100000"/>
               </a:lnSpc>
@@ -3143,7 +3224,7 @@
               <a:buNone/>
               <a:defRPr sz="2100"/>
             </a:lvl2pPr>
-            <a:lvl3pPr marL="342900" indent="711200" algn="ctr">
+            <a:lvl3pPr marL="228600" indent="114300" algn="ctr">
               <a:lnSpc>
                 <a:spcPct val="100000"/>
               </a:lnSpc>
@@ -3153,7 +3234,7 @@
               <a:buNone/>
               <a:defRPr sz="2100"/>
             </a:lvl3pPr>
-            <a:lvl4pPr marL="342900" indent="1168400" algn="ctr">
+            <a:lvl4pPr marL="228600" indent="114300" algn="ctr">
               <a:lnSpc>
                 <a:spcPct val="100000"/>
               </a:lnSpc>
@@ -3163,7 +3244,7 @@
               <a:buNone/>
               <a:defRPr sz="2100"/>
             </a:lvl4pPr>
-            <a:lvl5pPr marL="342900" indent="1625600" algn="ctr">
+            <a:lvl5pPr marL="228600" indent="114300" algn="ctr">
               <a:lnSpc>
                 <a:spcPct val="100000"/>
               </a:lnSpc>
@@ -3216,8 +3297,8 @@
         </p:nvSpPr>
         <p:spPr>
           <a:xfrm>
-            <a:off x="4939500" y="724199"/>
-            <a:ext cx="3837000" cy="3695101"/>
+            <a:off x="4939500" y="724198"/>
+            <a:ext cx="3837000" cy="3695102"/>
           </a:xfrm>
           <a:prstGeom prst="rect">
             <a:avLst/>
@@ -3227,16 +3308,7 @@
           <a:bodyPr anchor="ctr"/>
           <a:lstStyle/>
           <a:p>
-            <a:pPr>
-              <a:buClr>
-                <a:srgbClr val="FFFFFF"/>
-              </a:buClr>
-              <a:defRPr>
-                <a:solidFill>
-                  <a:srgbClr val="FFFFFF"/>
-                </a:solidFill>
-              </a:defRPr>
-            </a:pPr>
+            <a:pPr/>
           </a:p>
         </p:txBody>
       </p:sp>
@@ -3299,7 +3371,7 @@
         <p:spPr>
           <a:xfrm>
             <a:off x="319499" y="4230575"/>
-            <a:ext cx="5998802" cy="598801"/>
+            <a:ext cx="5998803" cy="598802"/>
           </a:xfrm>
           <a:prstGeom prst="rect">
             <a:avLst/>
@@ -3308,7 +3380,7 @@
         <p:txBody>
           <a:bodyPr anchor="ctr"/>
           <a:lstStyle>
-            <a:lvl1pPr marL="228600" indent="0">
+            <a:lvl1pPr marL="0" indent="228600">
               <a:lnSpc>
                 <a:spcPct val="100000"/>
               </a:lnSpc>
@@ -3450,9 +3522,9 @@
         <p:grpSpPr>
           <a:xfrm>
             <a:off x="0" y="3903669"/>
-            <a:ext cx="9144000" cy="1239926"/>
+            <a:ext cx="9144000" cy="1239928"/>
             <a:chOff x="0" y="0"/>
-            <a:chExt cx="9144000" cy="1239924"/>
+            <a:chExt cx="9144000" cy="1239927"/>
           </a:xfrm>
         </p:grpSpPr>
         <p:sp>
@@ -3463,8 +3535,8 @@
           </p:nvSpPr>
           <p:spPr>
             <a:xfrm>
-              <a:off x="8154895" y="0"/>
-              <a:ext cx="989101" cy="987900"/>
+              <a:off x="8154895" y="-1"/>
+              <a:ext cx="989102" cy="987903"/>
             </a:xfrm>
             <a:custGeom>
               <a:avLst/>
@@ -3510,7 +3582,7 @@
             <a:effectLst/>
           </p:spPr>
           <p:txBody>
-            <a:bodyPr wrap="square" lIns="45719" tIns="45719" rIns="45719" bIns="45719" numCol="1" anchor="ctr">
+            <a:bodyPr wrap="square" lIns="45718" tIns="45718" rIns="45718" bIns="45718" numCol="1" anchor="ctr">
               <a:noAutofit/>
             </a:bodyPr>
             <a:lstStyle/>
@@ -3520,6 +3592,10 @@
                   <a:solidFill>
                     <a:srgbClr val="000000"/>
                   </a:solidFill>
+                  <a:latin typeface="Arial"/>
+                  <a:ea typeface="Arial"/>
+                  <a:cs typeface="Arial"/>
+                  <a:sym typeface="Arial"/>
                 </a:defRPr>
               </a:pPr>
             </a:p>
@@ -3533,8 +3609,8 @@
           </p:nvSpPr>
           <p:spPr>
             <a:xfrm flipH="1">
-              <a:off x="6181163" y="0"/>
-              <a:ext cx="989101" cy="987900"/>
+              <a:off x="6181162" y="-1"/>
+              <a:ext cx="989103" cy="987903"/>
             </a:xfrm>
             <a:custGeom>
               <a:avLst/>
@@ -3580,7 +3656,7 @@
             <a:effectLst/>
           </p:spPr>
           <p:txBody>
-            <a:bodyPr wrap="square" lIns="45719" tIns="45719" rIns="45719" bIns="45719" numCol="1" anchor="ctr">
+            <a:bodyPr wrap="square" lIns="45718" tIns="45718" rIns="45718" bIns="45718" numCol="1" anchor="ctr">
               <a:noAutofit/>
             </a:bodyPr>
             <a:lstStyle/>
@@ -3590,6 +3666,10 @@
                   <a:solidFill>
                     <a:srgbClr val="000000"/>
                   </a:solidFill>
+                  <a:latin typeface="Arial"/>
+                  <a:ea typeface="Arial"/>
+                  <a:cs typeface="Arial"/>
+                  <a:sym typeface="Arial"/>
                 </a:defRPr>
               </a:pPr>
             </a:p>
@@ -3603,8 +3683,8 @@
           </p:nvSpPr>
           <p:spPr>
             <a:xfrm>
-              <a:off x="7170274" y="0"/>
-              <a:ext cx="989101" cy="987900"/>
+              <a:off x="7170273" y="0"/>
+              <a:ext cx="989103" cy="987902"/>
             </a:xfrm>
             <a:prstGeom prst="rect">
               <a:avLst/>
@@ -3619,7 +3699,7 @@
             <a:effectLst/>
           </p:spPr>
           <p:txBody>
-            <a:bodyPr wrap="square" lIns="45719" tIns="45719" rIns="45719" bIns="45719" numCol="1" anchor="ctr">
+            <a:bodyPr wrap="square" lIns="45718" tIns="45718" rIns="45718" bIns="45718" numCol="1" anchor="ctr">
               <a:noAutofit/>
             </a:bodyPr>
             <a:lstStyle/>
@@ -3629,6 +3709,10 @@
                   <a:solidFill>
                     <a:srgbClr val="000000"/>
                   </a:solidFill>
+                  <a:latin typeface="Arial"/>
+                  <a:ea typeface="Arial"/>
+                  <a:cs typeface="Arial"/>
+                  <a:sym typeface="Arial"/>
                 </a:defRPr>
               </a:pPr>
             </a:p>
@@ -3642,8 +3726,8 @@
           </p:nvSpPr>
           <p:spPr>
             <a:xfrm rot="10800000">
-              <a:off x="8154757" y="12"/>
-              <a:ext cx="989101" cy="987901"/>
+              <a:off x="8154757" y="11"/>
+              <a:ext cx="989102" cy="987904"/>
             </a:xfrm>
             <a:custGeom>
               <a:avLst/>
@@ -3689,7 +3773,7 @@
             <a:effectLst/>
           </p:spPr>
           <p:txBody>
-            <a:bodyPr wrap="square" lIns="45719" tIns="45719" rIns="45719" bIns="45719" numCol="1" anchor="ctr">
+            <a:bodyPr wrap="square" lIns="45718" tIns="45718" rIns="45718" bIns="45718" numCol="1" anchor="ctr">
               <a:noAutofit/>
             </a:bodyPr>
             <a:lstStyle/>
@@ -3699,6 +3783,10 @@
                   <a:solidFill>
                     <a:srgbClr val="000000"/>
                   </a:solidFill>
+                  <a:latin typeface="Arial"/>
+                  <a:ea typeface="Arial"/>
+                  <a:cs typeface="Arial"/>
+                  <a:sym typeface="Arial"/>
                 </a:defRPr>
               </a:pPr>
             </a:p>
@@ -3712,8 +3800,8 @@
           </p:nvSpPr>
           <p:spPr>
             <a:xfrm>
-              <a:off x="0" y="987925"/>
-              <a:ext cx="9144000" cy="252001"/>
+              <a:off x="0" y="987926"/>
+              <a:ext cx="9144000" cy="252002"/>
             </a:xfrm>
             <a:prstGeom prst="rect">
               <a:avLst/>
@@ -3728,7 +3816,7 @@
             <a:effectLst/>
           </p:spPr>
           <p:txBody>
-            <a:bodyPr wrap="square" lIns="45719" tIns="45719" rIns="45719" bIns="45719" numCol="1" anchor="ctr">
+            <a:bodyPr wrap="square" lIns="45718" tIns="45718" rIns="45718" bIns="45718" numCol="1" anchor="ctr">
               <a:noAutofit/>
             </a:bodyPr>
             <a:lstStyle/>
@@ -3738,6 +3826,10 @@
                   <a:solidFill>
                     <a:srgbClr val="000000"/>
                   </a:solidFill>
+                  <a:latin typeface="Arial"/>
+                  <a:ea typeface="Arial"/>
+                  <a:cs typeface="Arial"/>
+                  <a:sym typeface="Arial"/>
                 </a:defRPr>
               </a:pPr>
             </a:p>
@@ -3754,8 +3846,8 @@
         </p:nvSpPr>
         <p:spPr>
           <a:xfrm>
-            <a:off x="311699" y="410000"/>
-            <a:ext cx="8520602" cy="607801"/>
+            <a:off x="311698" y="410000"/>
+            <a:ext cx="8520603" cy="607802"/>
           </a:xfrm>
           <a:prstGeom prst="rect">
             <a:avLst/>
@@ -3770,7 +3862,7 @@
           </a:extLst>
         </p:spPr>
         <p:txBody>
-          <a:bodyPr lIns="91424" tIns="91424" rIns="91424" bIns="91424">
+          <a:bodyPr lIns="91423" tIns="91423" rIns="91423" bIns="91423">
             <a:normAutofit fontScale="100000" lnSpcReduction="0"/>
           </a:bodyPr>
           <a:lstStyle/>
@@ -3792,8 +3884,8 @@
         </p:nvSpPr>
         <p:spPr>
           <a:xfrm>
-            <a:off x="311699" y="1229875"/>
-            <a:ext cx="8520602" cy="3339001"/>
+            <a:off x="311698" y="1229875"/>
+            <a:ext cx="8520603" cy="3339001"/>
           </a:xfrm>
           <a:prstGeom prst="rect">
             <a:avLst/>
@@ -3808,7 +3900,7 @@
           </a:extLst>
         </p:spPr>
         <p:txBody>
-          <a:bodyPr lIns="91424" tIns="91424" rIns="91424" bIns="91424">
+          <a:bodyPr lIns="91423" tIns="91423" rIns="91423" bIns="91423">
             <a:normAutofit fontScale="100000" lnSpcReduction="0"/>
           </a:bodyPr>
           <a:lstStyle/>
@@ -3854,8 +3946,8 @@
         </p:nvSpPr>
         <p:spPr>
           <a:xfrm>
-            <a:off x="8672318" y="4680365"/>
-            <a:ext cx="336813" cy="335251"/>
+            <a:off x="8672320" y="4680366"/>
+            <a:ext cx="336811" cy="335249"/>
           </a:xfrm>
           <a:prstGeom prst="rect">
             <a:avLst/>
@@ -3865,7 +3957,7 @@
           </a:ln>
         </p:spPr>
         <p:txBody>
-          <a:bodyPr wrap="none" lIns="91424" tIns="91424" rIns="91424" bIns="91424" anchor="ctr">
+          <a:bodyPr wrap="none" lIns="91423" tIns="91423" rIns="91423" bIns="91423" anchor="ctr">
             <a:spAutoFit/>
           </a:bodyPr>
           <a:lstStyle>
@@ -4200,7 +4292,7 @@
           <a:sym typeface="Roboto"/>
         </a:defRPr>
       </a:lvl1pPr>
-      <a:lvl2pPr marL="1005114" marR="0" indent="-408214" algn="l" defTabSz="914400" rtl="0" latinLnBrk="0">
+      <a:lvl2pPr marL="1005114" marR="0" indent="-408213" algn="l" defTabSz="914400" rtl="0" latinLnBrk="0">
         <a:lnSpc>
           <a:spcPct val="115000"/>
         </a:lnSpc>
@@ -4355,7 +4447,7 @@
           <a:sym typeface="Roboto"/>
         </a:defRPr>
       </a:lvl6pPr>
-      <a:lvl7pPr marL="3291114" marR="0" indent="-408214" algn="l" defTabSz="914400" rtl="0" latinLnBrk="0">
+      <a:lvl7pPr marL="3291113" marR="0" indent="-408214" algn="l" defTabSz="914400" rtl="0" latinLnBrk="0">
         <a:lnSpc>
           <a:spcPct val="115000"/>
         </a:lnSpc>
@@ -4386,7 +4478,7 @@
           <a:sym typeface="Roboto"/>
         </a:defRPr>
       </a:lvl7pPr>
-      <a:lvl8pPr marL="3748314" marR="0" indent="-408214" algn="l" defTabSz="914400" rtl="0" latinLnBrk="0">
+      <a:lvl8pPr marL="3748313" marR="0" indent="-408213" algn="l" defTabSz="914400" rtl="0" latinLnBrk="0">
         <a:lnSpc>
           <a:spcPct val="115000"/>
         </a:lnSpc>
@@ -4417,7 +4509,7 @@
           <a:sym typeface="Roboto"/>
         </a:defRPr>
       </a:lvl8pPr>
-      <a:lvl9pPr marL="4205514" marR="0" indent="-408214" algn="l" defTabSz="914400" rtl="0" latinLnBrk="0">
+      <a:lvl9pPr marL="4205513" marR="0" indent="-408213" algn="l" defTabSz="914400" rtl="0" latinLnBrk="0">
         <a:lnSpc>
           <a:spcPct val="115000"/>
         </a:lnSpc>
@@ -4772,7 +4864,7 @@
         <p:spPr>
           <a:xfrm>
             <a:off x="598099" y="2571325"/>
-            <a:ext cx="3596701" cy="2409001"/>
+            <a:ext cx="3596702" cy="2409002"/>
           </a:xfrm>
           <a:prstGeom prst="rect">
             <a:avLst/>
@@ -4855,8 +4947,8 @@
         </p:nvSpPr>
         <p:spPr>
           <a:xfrm>
-            <a:off x="6312199" y="4286425"/>
-            <a:ext cx="2508001" cy="693901"/>
+            <a:off x="6312198" y="4286425"/>
+            <a:ext cx="2508002" cy="693902"/>
           </a:xfrm>
           <a:prstGeom prst="rect">
             <a:avLst/>
@@ -4871,7 +4963,7 @@
           </a:extLst>
         </p:spPr>
         <p:txBody>
-          <a:bodyPr lIns="91424" tIns="91424" rIns="91424" bIns="91424">
+          <a:bodyPr lIns="91423" tIns="91423" rIns="91423" bIns="91423">
             <a:normAutofit fontScale="100000" lnSpcReduction="0"/>
           </a:bodyPr>
           <a:lstStyle>
@@ -4925,7 +5017,7 @@
         <p:nvPicPr>
           <p:cNvPr id="144" name="ense470CurrentVSM.png" descr="ense470CurrentVSM.png"/>
           <p:cNvPicPr>
-            <a:picLocks noChangeAspect="0"/>
+            <a:picLocks noChangeAspect="1"/>
           </p:cNvPicPr>
           <p:nvPr/>
         </p:nvPicPr>
@@ -4939,8 +5031,8 @@
         </p:blipFill>
         <p:spPr>
           <a:xfrm>
-            <a:off x="53424" y="-5118"/>
-            <a:ext cx="9144001" cy="5153736"/>
+            <a:off x="53423" y="-5119"/>
+            <a:ext cx="9144002" cy="5153737"/>
           </a:xfrm>
           <a:prstGeom prst="rect">
             <a:avLst/>
@@ -4976,69 +5068,11 @@
           <a:chExt cx="0" cy="0"/>
         </a:xfrm>
       </p:grpSpPr>
-      <p:sp>
-        <p:nvSpPr>
-          <p:cNvPr id="146" name="Shape 92"/>
-          <p:cNvSpPr txBox="1"/>
-          <p:nvPr>
-            <p:ph type="title"/>
-          </p:nvPr>
-        </p:nvSpPr>
-        <p:spPr>
-          <a:xfrm>
-            <a:off x="311699" y="410000"/>
-            <a:ext cx="8520602" cy="607801"/>
-          </a:xfrm>
-          <a:prstGeom prst="rect">
-            <a:avLst/>
-          </a:prstGeom>
-        </p:spPr>
-        <p:txBody>
-          <a:bodyPr/>
-          <a:lstStyle/>
-          <a:p>
-            <a:pPr defTabSz="850391">
-              <a:defRPr sz="2790"/>
-            </a:pPr>
-          </a:p>
-        </p:txBody>
-      </p:sp>
-      <p:sp>
-        <p:nvSpPr>
-          <p:cNvPr id="147" name="Shape 93"/>
-          <p:cNvSpPr txBox="1"/>
-          <p:nvPr>
-            <p:ph type="body" idx="1"/>
-          </p:nvPr>
-        </p:nvSpPr>
-        <p:spPr>
-          <a:xfrm>
-            <a:off x="311699" y="1229874"/>
-            <a:ext cx="8520602" cy="3339002"/>
-          </a:xfrm>
-          <a:prstGeom prst="rect">
-            <a:avLst/>
-          </a:prstGeom>
-        </p:spPr>
-        <p:txBody>
-          <a:bodyPr/>
-          <a:lstStyle/>
-          <a:p>
-            <a:pPr marL="0" indent="0">
-              <a:spcBef>
-                <a:spcPts val="1600"/>
-              </a:spcBef>
-              <a:buSzTx/>
-              <a:buNone/>
-            </a:pPr>
-          </a:p>
-        </p:txBody>
-      </p:sp>
       <p:pic>
         <p:nvPicPr>
-          <p:cNvPr id="148" name="Shape 94" descr="Shape 94"/>
+          <p:cNvPr id="146" name="ense470CurrentVSM.png" descr="ense470CurrentVSM.png"/>
           <p:cNvPicPr>
-            <a:picLocks noChangeAspect="1"/>
+            <a:picLocks noChangeAspect="0"/>
           </p:cNvPicPr>
           <p:nvPr/>
         </p:nvPicPr>
@@ -5052,8 +5086,8 @@
         </p:blipFill>
         <p:spPr>
           <a:xfrm>
-            <a:off x="-5" y="0"/>
-            <a:ext cx="9144001" cy="5143499"/>
+            <a:off x="-31404" y="-29700"/>
+            <a:ext cx="9206808" cy="5202900"/>
           </a:xfrm>
           <a:prstGeom prst="rect">
             <a:avLst/>
@@ -5091,7 +5125,7 @@
       </p:grpSpPr>
       <p:sp>
         <p:nvSpPr>
-          <p:cNvPr id="150" name="Shape 99"/>
+          <p:cNvPr id="148" name="Shape 99"/>
           <p:cNvSpPr txBox="1"/>
           <p:nvPr>
             <p:ph type="title"/>
@@ -5100,7 +5134,7 @@
         <p:spPr>
           <a:xfrm>
             <a:off x="311699" y="410000"/>
-            <a:ext cx="8520602" cy="607801"/>
+            <a:ext cx="8520602" cy="607802"/>
           </a:xfrm>
           <a:prstGeom prst="rect">
             <a:avLst/>
@@ -5110,7 +5144,7 @@
           <a:bodyPr/>
           <a:lstStyle>
             <a:lvl1pPr defTabSz="850391">
-              <a:defRPr sz="2790"/>
+              <a:defRPr sz="2700"/>
             </a:lvl1pPr>
           </a:lstStyle>
           <a:p>
@@ -5123,7 +5157,7 @@
       </p:sp>
       <p:sp>
         <p:nvSpPr>
-          <p:cNvPr id="151" name="Shape 100"/>
+          <p:cNvPr id="149" name="Shape 100"/>
           <p:cNvSpPr txBox="1"/>
           <p:nvPr>
             <p:ph type="body" idx="1"/>
@@ -5131,7 +5165,7 @@
         </p:nvSpPr>
         <p:spPr>
           <a:xfrm>
-            <a:off x="311699" y="893792"/>
+            <a:off x="311699" y="893791"/>
             <a:ext cx="8520602" cy="3675084"/>
           </a:xfrm>
           <a:prstGeom prst="rect">
@@ -5142,12 +5176,12 @@
           <a:bodyPr/>
           <a:lstStyle/>
           <a:p>
-            <a:pPr marL="384047" indent="-288035" algn="just" defTabSz="768095">
+            <a:pPr marL="384047" indent="-288035" algn="just" defTabSz="768094">
               <a:buClr>
                 <a:srgbClr val="000000"/>
               </a:buClr>
               <a:buSzPts val="1500"/>
-              <a:defRPr sz="1512">
+              <a:defRPr sz="1500">
                 <a:solidFill>
                   <a:srgbClr val="000000"/>
                 </a:solidFill>
@@ -5158,32 +5192,29 @@
             </a:r>
           </a:p>
           <a:p>
-            <a:pPr lvl="1" marL="768095" indent="-288035" algn="just" defTabSz="768095">
+            <a:pPr lvl="1" marL="768094" indent="-288035" algn="just" defTabSz="768094">
               <a:buClr>
                 <a:srgbClr val="000000"/>
               </a:buClr>
               <a:buSzPts val="1500"/>
               <a:buChar char="●"/>
-              <a:defRPr sz="1512">
+              <a:defRPr sz="1500">
                 <a:solidFill>
                   <a:srgbClr val="000000"/>
                 </a:solidFill>
               </a:defRPr>
             </a:pPr>
             <a:r>
-              <a:t>At first, when we read the whole project, it was overwhelming and hard to understand since this is our first milestone</a:t>
+              <a:t>At first, when we read the whole project, it was overwhelming and hard to understand since this is our first milestone. It was very useful because it helped simplify and understand the whole project. We had to redo it a few times.</a:t>
             </a:r>
-            <a:r>
-              <a:t>. It was very useful because it helped simplify and understand the whole project. We had to redo it a few times.</a:t>
-            </a:r>
-          </a:p>
-          <a:p>
-            <a:pPr marL="384047" indent="-288035" algn="just" defTabSz="768095">
+          </a:p>
+          <a:p>
+            <a:pPr marL="384047" indent="-288035" algn="just" defTabSz="768094">
               <a:buClr>
                 <a:srgbClr val="000000"/>
               </a:buClr>
               <a:buSzPts val="1500"/>
-              <a:defRPr sz="1512">
+              <a:defRPr sz="1500">
                 <a:solidFill>
                   <a:srgbClr val="000000"/>
                 </a:solidFill>
@@ -5194,13 +5225,13 @@
             </a:r>
           </a:p>
           <a:p>
-            <a:pPr lvl="1" marL="768095" indent="-288035" algn="just" defTabSz="768095">
+            <a:pPr lvl="1" marL="768094" indent="-288035" algn="just" defTabSz="768094">
               <a:buClr>
                 <a:srgbClr val="000000"/>
               </a:buClr>
               <a:buSzPts val="1500"/>
               <a:buChar char="●"/>
-              <a:defRPr sz="1512">
+              <a:defRPr sz="1500">
                 <a:solidFill>
                   <a:srgbClr val="000000"/>
                 </a:solidFill>
@@ -5211,12 +5242,12 @@
             </a:r>
           </a:p>
           <a:p>
-            <a:pPr marL="384047" indent="-288035" algn="just" defTabSz="768095">
+            <a:pPr marL="384047" indent="-288035" algn="just" defTabSz="768094">
               <a:buClr>
                 <a:srgbClr val="000000"/>
               </a:buClr>
               <a:buSzPts val="1500"/>
-              <a:defRPr sz="1512">
+              <a:defRPr sz="1500">
                 <a:solidFill>
                   <a:srgbClr val="000000"/>
                 </a:solidFill>
@@ -5227,13 +5258,13 @@
             </a:r>
           </a:p>
           <a:p>
-            <a:pPr lvl="1" marL="768095" indent="-288035" algn="just" defTabSz="768095">
+            <a:pPr lvl="1" marL="768094" indent="-288035" algn="just" defTabSz="768094">
               <a:buClr>
                 <a:srgbClr val="000000"/>
               </a:buClr>
               <a:buSzPts val="1500"/>
               <a:buChar char="●"/>
-              <a:defRPr sz="1512">
+              <a:defRPr sz="1500">
                 <a:solidFill>
                   <a:srgbClr val="000000"/>
                 </a:solidFill>
@@ -5244,13 +5275,13 @@
             </a:r>
           </a:p>
           <a:p>
-            <a:pPr lvl="1" marL="768095" indent="-288035" algn="just" defTabSz="768095">
+            <a:pPr lvl="1" marL="768094" indent="-288035" algn="just" defTabSz="768094">
               <a:buClr>
                 <a:srgbClr val="000000"/>
               </a:buClr>
               <a:buSzPts val="1500"/>
               <a:buChar char="●"/>
-              <a:defRPr sz="1512">
+              <a:defRPr sz="1500">
                 <a:solidFill>
                   <a:srgbClr val="000000"/>
                 </a:solidFill>
@@ -5416,9 +5447,9 @@
         </a:effectStyle>
         <a:effectStyle>
           <a:effectLst>
-            <a:outerShdw sx="100000" sy="100000" kx="0" ky="0" algn="b" rotWithShape="0" blurRad="38100" dist="20000" dir="5400000">
+            <a:outerShdw sx="100000" sy="100000" kx="0" ky="0" algn="b" rotWithShape="0" blurRad="38100" dist="23000" dir="5400000">
               <a:srgbClr val="000000">
-                <a:alpha val="38000"/>
+                <a:alpha val="35000"/>
               </a:srgbClr>
             </a:outerShdw>
           </a:effectLst>
@@ -5480,7 +5511,7 @@
     <a:spDef>
       <a:spPr>
         <a:solidFill>
-          <a:srgbClr val="FFFFFF"/>
+          <a:srgbClr val="2A3990"/>
         </a:solidFill>
         <a:ln w="25400" cap="flat">
           <a:solidFill>
@@ -5498,7 +5529,7 @@
         </a:effectLst>
         <a:sp3d/>
       </a:spPr>
-      <a:bodyPr rot="0" spcFirstLastPara="1" vertOverflow="overflow" horzOverflow="overflow" vert="horz" wrap="square" lIns="45719" tIns="45719" rIns="45719" bIns="45719" numCol="1" spcCol="38100" rtlCol="0" anchor="ctr" upright="0">
+      <a:bodyPr rot="0" spcFirstLastPara="1" vertOverflow="overflow" horzOverflow="overflow" vert="horz" wrap="square" lIns="45718" tIns="45718" rIns="45718" bIns="45718" numCol="1" spcCol="38100" rtlCol="0" anchor="ctr" upright="0">
         <a:spAutoFit/>
       </a:bodyPr>
       <a:lstStyle>
@@ -5526,10 +5557,10 @@
             </a:solidFill>
             <a:effectLst/>
             <a:uFillTx/>
-            <a:latin typeface="Arial"/>
-            <a:ea typeface="Arial"/>
-            <a:cs typeface="Arial"/>
-            <a:sym typeface="Arial"/>
+            <a:latin typeface="+mn-lt"/>
+            <a:ea typeface="+mn-ea"/>
+            <a:cs typeface="+mn-cs"/>
+            <a:sym typeface="Helvetica"/>
           </a:defRPr>
         </a:defPPr>
         <a:lvl1pPr marL="0" marR="0" indent="0" algn="l" defTabSz="914400" rtl="0" fontAlgn="auto" latinLnBrk="1" hangingPunct="0">
@@ -5785,9 +5816,9 @@
           <a:round/>
         </a:ln>
         <a:effectLst>
-          <a:outerShdw sx="100000" sy="100000" kx="0" ky="0" algn="b" rotWithShape="0" blurRad="38100" dist="20000" dir="5400000">
+          <a:outerShdw sx="100000" sy="100000" kx="0" ky="0" algn="b" rotWithShape="0" blurRad="38100" dist="23000" dir="5400000">
             <a:srgbClr val="000000">
-              <a:alpha val="38000"/>
+              <a:alpha val="35000"/>
             </a:srgbClr>
           </a:outerShdw>
         </a:effectLst>
@@ -6075,7 +6106,7 @@
         <a:effectLst/>
         <a:sp3d/>
       </a:spPr>
-      <a:bodyPr rot="0" spcFirstLastPara="1" vertOverflow="overflow" horzOverflow="overflow" vert="horz" wrap="square" lIns="45719" tIns="45719" rIns="45719" bIns="45719" numCol="1" spcCol="38100" rtlCol="0" anchor="t" upright="0">
+      <a:bodyPr rot="0" spcFirstLastPara="1" vertOverflow="overflow" horzOverflow="overflow" vert="horz" wrap="square" lIns="45718" tIns="45718" rIns="45718" bIns="45718" numCol="1" spcCol="38100" rtlCol="0" anchor="t" upright="0">
         <a:spAutoFit/>
       </a:bodyPr>
       <a:lstStyle>
@@ -6103,10 +6134,10 @@
             </a:solidFill>
             <a:effectLst/>
             <a:uFillTx/>
-            <a:latin typeface="Arial"/>
-            <a:ea typeface="Arial"/>
-            <a:cs typeface="Arial"/>
-            <a:sym typeface="Arial"/>
+            <a:latin typeface="+mn-lt"/>
+            <a:ea typeface="+mn-ea"/>
+            <a:cs typeface="+mn-cs"/>
+            <a:sym typeface="Helvetica"/>
           </a:defRPr>
         </a:defPPr>
         <a:lvl1pPr marL="0" marR="0" indent="0" algn="l" defTabSz="914400" rtl="0" fontAlgn="auto" latinLnBrk="1" hangingPunct="0">
@@ -6500,9 +6531,9 @@
         </a:effectStyle>
         <a:effectStyle>
           <a:effectLst>
-            <a:outerShdw sx="100000" sy="100000" kx="0" ky="0" algn="b" rotWithShape="0" blurRad="38100" dist="20000" dir="5400000">
+            <a:outerShdw sx="100000" sy="100000" kx="0" ky="0" algn="b" rotWithShape="0" blurRad="38100" dist="23000" dir="5400000">
               <a:srgbClr val="000000">
-                <a:alpha val="38000"/>
+                <a:alpha val="35000"/>
               </a:srgbClr>
             </a:outerShdw>
           </a:effectLst>
@@ -6564,7 +6595,7 @@
     <a:spDef>
       <a:spPr>
         <a:solidFill>
-          <a:srgbClr val="FFFFFF"/>
+          <a:srgbClr val="2A3990"/>
         </a:solidFill>
         <a:ln w="25400" cap="flat">
           <a:solidFill>
@@ -6582,7 +6613,7 @@
         </a:effectLst>
         <a:sp3d/>
       </a:spPr>
-      <a:bodyPr rot="0" spcFirstLastPara="1" vertOverflow="overflow" horzOverflow="overflow" vert="horz" wrap="square" lIns="45719" tIns="45719" rIns="45719" bIns="45719" numCol="1" spcCol="38100" rtlCol="0" anchor="ctr" upright="0">
+      <a:bodyPr rot="0" spcFirstLastPara="1" vertOverflow="overflow" horzOverflow="overflow" vert="horz" wrap="square" lIns="45718" tIns="45718" rIns="45718" bIns="45718" numCol="1" spcCol="38100" rtlCol="0" anchor="ctr" upright="0">
         <a:spAutoFit/>
       </a:bodyPr>
       <a:lstStyle>
@@ -6610,10 +6641,10 @@
             </a:solidFill>
             <a:effectLst/>
             <a:uFillTx/>
-            <a:latin typeface="Arial"/>
-            <a:ea typeface="Arial"/>
-            <a:cs typeface="Arial"/>
-            <a:sym typeface="Arial"/>
+            <a:latin typeface="+mn-lt"/>
+            <a:ea typeface="+mn-ea"/>
+            <a:cs typeface="+mn-cs"/>
+            <a:sym typeface="Helvetica"/>
           </a:defRPr>
         </a:defPPr>
         <a:lvl1pPr marL="0" marR="0" indent="0" algn="l" defTabSz="914400" rtl="0" fontAlgn="auto" latinLnBrk="1" hangingPunct="0">
@@ -6869,9 +6900,9 @@
           <a:round/>
         </a:ln>
         <a:effectLst>
-          <a:outerShdw sx="100000" sy="100000" kx="0" ky="0" algn="b" rotWithShape="0" blurRad="38100" dist="20000" dir="5400000">
+          <a:outerShdw sx="100000" sy="100000" kx="0" ky="0" algn="b" rotWithShape="0" blurRad="38100" dist="23000" dir="5400000">
             <a:srgbClr val="000000">
-              <a:alpha val="38000"/>
+              <a:alpha val="35000"/>
             </a:srgbClr>
           </a:outerShdw>
         </a:effectLst>
@@ -7159,7 +7190,7 @@
         <a:effectLst/>
         <a:sp3d/>
       </a:spPr>
-      <a:bodyPr rot="0" spcFirstLastPara="1" vertOverflow="overflow" horzOverflow="overflow" vert="horz" wrap="square" lIns="45719" tIns="45719" rIns="45719" bIns="45719" numCol="1" spcCol="38100" rtlCol="0" anchor="t" upright="0">
+      <a:bodyPr rot="0" spcFirstLastPara="1" vertOverflow="overflow" horzOverflow="overflow" vert="horz" wrap="square" lIns="45718" tIns="45718" rIns="45718" bIns="45718" numCol="1" spcCol="38100" rtlCol="0" anchor="t" upright="0">
         <a:spAutoFit/>
       </a:bodyPr>
       <a:lstStyle>
@@ -7187,10 +7218,10 @@
             </a:solidFill>
             <a:effectLst/>
             <a:uFillTx/>
-            <a:latin typeface="Arial"/>
-            <a:ea typeface="Arial"/>
-            <a:cs typeface="Arial"/>
-            <a:sym typeface="Arial"/>
+            <a:latin typeface="+mn-lt"/>
+            <a:ea typeface="+mn-ea"/>
+            <a:cs typeface="+mn-cs"/>
+            <a:sym typeface="Helvetica"/>
           </a:defRPr>
         </a:defPPr>
         <a:lvl1pPr marL="0" marR="0" indent="0" algn="l" defTabSz="914400" rtl="0" fontAlgn="auto" latinLnBrk="1" hangingPunct="0">

</xml_diff>

<commit_message>
Milestone 1 Final Version (Fixed)
</commit_message>
<xml_diff>
--- a/ENSE 470 - Milestone 1.pptx
+++ b/ENSE 470 - Milestone 1.pptx
@@ -66,9 +66,9 @@
         </a:solidFill>
         <a:effectLst/>
         <a:uFillTx/>
-        <a:latin typeface="+mn-lt"/>
-        <a:ea typeface="+mn-ea"/>
-        <a:cs typeface="+mn-cs"/>
+        <a:latin typeface="+mj-lt"/>
+        <a:ea typeface="+mj-ea"/>
+        <a:cs typeface="+mj-cs"/>
         <a:sym typeface="Helvetica"/>
       </a:defRPr>
     </a:lvl1pPr>
@@ -96,9 +96,9 @@
         </a:solidFill>
         <a:effectLst/>
         <a:uFillTx/>
-        <a:latin typeface="+mn-lt"/>
-        <a:ea typeface="+mn-ea"/>
-        <a:cs typeface="+mn-cs"/>
+        <a:latin typeface="+mj-lt"/>
+        <a:ea typeface="+mj-ea"/>
+        <a:cs typeface="+mj-cs"/>
         <a:sym typeface="Helvetica"/>
       </a:defRPr>
     </a:lvl2pPr>
@@ -126,9 +126,9 @@
         </a:solidFill>
         <a:effectLst/>
         <a:uFillTx/>
-        <a:latin typeface="+mn-lt"/>
-        <a:ea typeface="+mn-ea"/>
-        <a:cs typeface="+mn-cs"/>
+        <a:latin typeface="+mj-lt"/>
+        <a:ea typeface="+mj-ea"/>
+        <a:cs typeface="+mj-cs"/>
         <a:sym typeface="Helvetica"/>
       </a:defRPr>
     </a:lvl3pPr>
@@ -156,9 +156,9 @@
         </a:solidFill>
         <a:effectLst/>
         <a:uFillTx/>
-        <a:latin typeface="+mn-lt"/>
-        <a:ea typeface="+mn-ea"/>
-        <a:cs typeface="+mn-cs"/>
+        <a:latin typeface="+mj-lt"/>
+        <a:ea typeface="+mj-ea"/>
+        <a:cs typeface="+mj-cs"/>
         <a:sym typeface="Helvetica"/>
       </a:defRPr>
     </a:lvl4pPr>
@@ -186,9 +186,9 @@
         </a:solidFill>
         <a:effectLst/>
         <a:uFillTx/>
-        <a:latin typeface="+mn-lt"/>
-        <a:ea typeface="+mn-ea"/>
-        <a:cs typeface="+mn-cs"/>
+        <a:latin typeface="+mj-lt"/>
+        <a:ea typeface="+mj-ea"/>
+        <a:cs typeface="+mj-cs"/>
         <a:sym typeface="Helvetica"/>
       </a:defRPr>
     </a:lvl5pPr>
@@ -216,9 +216,9 @@
         </a:solidFill>
         <a:effectLst/>
         <a:uFillTx/>
-        <a:latin typeface="+mn-lt"/>
-        <a:ea typeface="+mn-ea"/>
-        <a:cs typeface="+mn-cs"/>
+        <a:latin typeface="+mj-lt"/>
+        <a:ea typeface="+mj-ea"/>
+        <a:cs typeface="+mj-cs"/>
         <a:sym typeface="Helvetica"/>
       </a:defRPr>
     </a:lvl6pPr>
@@ -246,9 +246,9 @@
         </a:solidFill>
         <a:effectLst/>
         <a:uFillTx/>
-        <a:latin typeface="+mn-lt"/>
-        <a:ea typeface="+mn-ea"/>
-        <a:cs typeface="+mn-cs"/>
+        <a:latin typeface="+mj-lt"/>
+        <a:ea typeface="+mj-ea"/>
+        <a:cs typeface="+mj-cs"/>
         <a:sym typeface="Helvetica"/>
       </a:defRPr>
     </a:lvl7pPr>
@@ -276,9 +276,9 @@
         </a:solidFill>
         <a:effectLst/>
         <a:uFillTx/>
-        <a:latin typeface="+mn-lt"/>
-        <a:ea typeface="+mn-ea"/>
-        <a:cs typeface="+mn-cs"/>
+        <a:latin typeface="+mj-lt"/>
+        <a:ea typeface="+mj-ea"/>
+        <a:cs typeface="+mj-cs"/>
         <a:sym typeface="Helvetica"/>
       </a:defRPr>
     </a:lvl8pPr>
@@ -306,9 +306,9 @@
         </a:solidFill>
         <a:effectLst/>
         <a:uFillTx/>
-        <a:latin typeface="+mn-lt"/>
-        <a:ea typeface="+mn-ea"/>
-        <a:cs typeface="+mn-cs"/>
+        <a:latin typeface="+mj-lt"/>
+        <a:ea typeface="+mj-ea"/>
+        <a:cs typeface="+mj-cs"/>
         <a:sym typeface="Helvetica"/>
       </a:defRPr>
     </a:lvl9pPr>
@@ -393,73 +393,73 @@
   <p:notesStyle>
     <a:lvl1pPr latinLnBrk="0">
       <a:defRPr>
-        <a:latin typeface="+mj-lt"/>
-        <a:ea typeface="+mj-ea"/>
-        <a:cs typeface="+mj-cs"/>
+        <a:latin typeface="+mn-lt"/>
+        <a:ea typeface="+mn-ea"/>
+        <a:cs typeface="+mn-cs"/>
         <a:sym typeface="Helvetica Neue"/>
       </a:defRPr>
     </a:lvl1pPr>
     <a:lvl2pPr indent="228600" latinLnBrk="0">
       <a:defRPr>
-        <a:latin typeface="+mj-lt"/>
-        <a:ea typeface="+mj-ea"/>
-        <a:cs typeface="+mj-cs"/>
+        <a:latin typeface="+mn-lt"/>
+        <a:ea typeface="+mn-ea"/>
+        <a:cs typeface="+mn-cs"/>
         <a:sym typeface="Helvetica Neue"/>
       </a:defRPr>
     </a:lvl2pPr>
     <a:lvl3pPr indent="457200" latinLnBrk="0">
       <a:defRPr>
-        <a:latin typeface="+mj-lt"/>
-        <a:ea typeface="+mj-ea"/>
-        <a:cs typeface="+mj-cs"/>
+        <a:latin typeface="+mn-lt"/>
+        <a:ea typeface="+mn-ea"/>
+        <a:cs typeface="+mn-cs"/>
         <a:sym typeface="Helvetica Neue"/>
       </a:defRPr>
     </a:lvl3pPr>
     <a:lvl4pPr indent="685800" latinLnBrk="0">
       <a:defRPr>
-        <a:latin typeface="+mj-lt"/>
-        <a:ea typeface="+mj-ea"/>
-        <a:cs typeface="+mj-cs"/>
+        <a:latin typeface="+mn-lt"/>
+        <a:ea typeface="+mn-ea"/>
+        <a:cs typeface="+mn-cs"/>
         <a:sym typeface="Helvetica Neue"/>
       </a:defRPr>
     </a:lvl4pPr>
     <a:lvl5pPr indent="914400" latinLnBrk="0">
       <a:defRPr>
-        <a:latin typeface="+mj-lt"/>
-        <a:ea typeface="+mj-ea"/>
-        <a:cs typeface="+mj-cs"/>
+        <a:latin typeface="+mn-lt"/>
+        <a:ea typeface="+mn-ea"/>
+        <a:cs typeface="+mn-cs"/>
         <a:sym typeface="Helvetica Neue"/>
       </a:defRPr>
     </a:lvl5pPr>
     <a:lvl6pPr indent="1143000" latinLnBrk="0">
       <a:defRPr>
-        <a:latin typeface="+mj-lt"/>
-        <a:ea typeface="+mj-ea"/>
-        <a:cs typeface="+mj-cs"/>
+        <a:latin typeface="+mn-lt"/>
+        <a:ea typeface="+mn-ea"/>
+        <a:cs typeface="+mn-cs"/>
         <a:sym typeface="Helvetica Neue"/>
       </a:defRPr>
     </a:lvl6pPr>
     <a:lvl7pPr indent="1371600" latinLnBrk="0">
       <a:defRPr>
-        <a:latin typeface="+mj-lt"/>
-        <a:ea typeface="+mj-ea"/>
-        <a:cs typeface="+mj-cs"/>
+        <a:latin typeface="+mn-lt"/>
+        <a:ea typeface="+mn-ea"/>
+        <a:cs typeface="+mn-cs"/>
         <a:sym typeface="Helvetica Neue"/>
       </a:defRPr>
     </a:lvl7pPr>
     <a:lvl8pPr indent="1600200" latinLnBrk="0">
       <a:defRPr>
-        <a:latin typeface="+mj-lt"/>
-        <a:ea typeface="+mj-ea"/>
-        <a:cs typeface="+mj-cs"/>
+        <a:latin typeface="+mn-lt"/>
+        <a:ea typeface="+mn-ea"/>
+        <a:cs typeface="+mn-cs"/>
         <a:sym typeface="Helvetica Neue"/>
       </a:defRPr>
     </a:lvl8pPr>
     <a:lvl9pPr indent="1828800" latinLnBrk="0">
       <a:defRPr>
-        <a:latin typeface="+mj-lt"/>
-        <a:ea typeface="+mj-ea"/>
-        <a:cs typeface="+mj-cs"/>
+        <a:latin typeface="+mn-lt"/>
+        <a:ea typeface="+mn-ea"/>
+        <a:cs typeface="+mn-cs"/>
         <a:sym typeface="Helvetica Neue"/>
       </a:defRPr>
     </a:lvl9pPr>
@@ -499,10 +499,10 @@
         </p:nvGrpSpPr>
         <p:grpSpPr>
           <a:xfrm>
-            <a:off x="6098377" y="3"/>
-            <a:ext cx="3045627" cy="2030575"/>
-            <a:chOff x="-1" y="0"/>
-            <a:chExt cx="3045626" cy="2030573"/>
+            <a:off x="6098376" y="1"/>
+            <a:ext cx="3045629" cy="2030578"/>
+            <a:chOff x="0" y="-1"/>
+            <a:chExt cx="3045627" cy="2030576"/>
           </a:xfrm>
         </p:grpSpPr>
         <p:sp>
@@ -513,8 +513,8 @@
           </p:nvSpPr>
           <p:spPr>
             <a:xfrm>
-              <a:off x="2030424" y="10"/>
-              <a:ext cx="1015202" cy="1015203"/>
+              <a:off x="2030425" y="9"/>
+              <a:ext cx="1015203" cy="1015206"/>
             </a:xfrm>
             <a:prstGeom prst="rect">
               <a:avLst/>
@@ -556,8 +556,8 @@
           </p:nvSpPr>
           <p:spPr>
             <a:xfrm flipH="1">
-              <a:off x="1015084" y="-1"/>
-              <a:ext cx="1015203" cy="1015204"/>
+              <a:off x="1015085" y="-2"/>
+              <a:ext cx="1015204" cy="1015207"/>
             </a:xfrm>
             <a:custGeom>
               <a:avLst/>
@@ -630,8 +630,8 @@
           </p:nvSpPr>
           <p:spPr>
             <a:xfrm flipH="1" rot="10800000">
-              <a:off x="1015209" y="102"/>
-              <a:ext cx="1015202" cy="1015203"/>
+              <a:off x="1015210" y="102"/>
+              <a:ext cx="1015203" cy="1015205"/>
             </a:xfrm>
             <a:custGeom>
               <a:avLst/>
@@ -705,7 +705,7 @@
           <p:spPr>
             <a:xfrm rot="10800000">
               <a:off x="-1" y="92"/>
-              <a:ext cx="1015203" cy="1015203"/>
+              <a:ext cx="1015205" cy="1015205"/>
             </a:xfrm>
             <a:custGeom>
               <a:avLst/>
@@ -778,8 +778,8 @@
           </p:nvSpPr>
           <p:spPr>
             <a:xfrm rot="10800000">
-              <a:off x="2030410" y="1015370"/>
-              <a:ext cx="1015203" cy="1015203"/>
+              <a:off x="2030411" y="1015371"/>
+              <a:ext cx="1015205" cy="1015205"/>
             </a:xfrm>
             <a:custGeom>
               <a:avLst/>
@@ -856,7 +856,7 @@
         <p:spPr>
           <a:xfrm>
             <a:off x="598100" y="1775222"/>
-            <a:ext cx="8222100" cy="838802"/>
+            <a:ext cx="8222100" cy="838803"/>
           </a:xfrm>
           <a:prstGeom prst="rect">
             <a:avLst/>
@@ -891,8 +891,8 @@
         </p:nvSpPr>
         <p:spPr>
           <a:xfrm>
-            <a:off x="598088" y="2715911"/>
-            <a:ext cx="8222100" cy="432902"/>
+            <a:off x="598088" y="2715910"/>
+            <a:ext cx="8222100" cy="432903"/>
           </a:xfrm>
           <a:prstGeom prst="rect">
             <a:avLst/>
@@ -901,7 +901,7 @@
         <p:txBody>
           <a:bodyPr/>
           <a:lstStyle>
-            <a:lvl1pPr marL="228600" indent="-114300">
+            <a:lvl1pPr marL="114300" indent="0">
               <a:lnSpc>
                 <a:spcPct val="100000"/>
               </a:lnSpc>
@@ -915,7 +915,7 @@
                 </a:solidFill>
               </a:defRPr>
             </a:lvl1pPr>
-            <a:lvl2pPr marL="228600" indent="114300">
+            <a:lvl2pPr marL="114300" indent="114300">
               <a:lnSpc>
                 <a:spcPct val="100000"/>
               </a:lnSpc>
@@ -929,7 +929,7 @@
                 </a:solidFill>
               </a:defRPr>
             </a:lvl2pPr>
-            <a:lvl3pPr marL="228600" indent="114300">
+            <a:lvl3pPr marL="114300" indent="114300">
               <a:lnSpc>
                 <a:spcPct val="100000"/>
               </a:lnSpc>
@@ -943,7 +943,7 @@
                 </a:solidFill>
               </a:defRPr>
             </a:lvl3pPr>
-            <a:lvl4pPr marL="228600" indent="114300">
+            <a:lvl4pPr marL="114300" indent="114300">
               <a:lnSpc>
                 <a:spcPct val="100000"/>
               </a:lnSpc>
@@ -957,7 +957,7 @@
                 </a:solidFill>
               </a:defRPr>
             </a:lvl4pPr>
-            <a:lvl5pPr marL="228600" indent="114300">
+            <a:lvl5pPr marL="114300" indent="114300">
               <a:lnSpc>
                 <a:spcPct val="100000"/>
               </a:lnSpc>
@@ -1067,10 +1067,10 @@
         </p:nvGrpSpPr>
         <p:grpSpPr>
           <a:xfrm>
-            <a:off x="6098377" y="3"/>
-            <a:ext cx="3045627" cy="2030575"/>
-            <a:chOff x="-1" y="0"/>
-            <a:chExt cx="3045626" cy="2030573"/>
+            <a:off x="6098376" y="1"/>
+            <a:ext cx="3045629" cy="2030578"/>
+            <a:chOff x="0" y="-1"/>
+            <a:chExt cx="3045627" cy="2030576"/>
           </a:xfrm>
         </p:grpSpPr>
         <p:sp>
@@ -1081,8 +1081,8 @@
           </p:nvSpPr>
           <p:spPr>
             <a:xfrm>
-              <a:off x="2030424" y="10"/>
-              <a:ext cx="1015202" cy="1015203"/>
+              <a:off x="2030425" y="9"/>
+              <a:ext cx="1015203" cy="1015206"/>
             </a:xfrm>
             <a:prstGeom prst="rect">
               <a:avLst/>
@@ -1124,8 +1124,8 @@
           </p:nvSpPr>
           <p:spPr>
             <a:xfrm flipH="1">
-              <a:off x="1015084" y="-1"/>
-              <a:ext cx="1015203" cy="1015204"/>
+              <a:off x="1015085" y="-2"/>
+              <a:ext cx="1015204" cy="1015207"/>
             </a:xfrm>
             <a:custGeom>
               <a:avLst/>
@@ -1198,8 +1198,8 @@
           </p:nvSpPr>
           <p:spPr>
             <a:xfrm flipH="1" rot="10800000">
-              <a:off x="1015209" y="102"/>
-              <a:ext cx="1015202" cy="1015203"/>
+              <a:off x="1015210" y="102"/>
+              <a:ext cx="1015203" cy="1015205"/>
             </a:xfrm>
             <a:custGeom>
               <a:avLst/>
@@ -1273,7 +1273,7 @@
           <p:spPr>
             <a:xfrm rot="10800000">
               <a:off x="-1" y="92"/>
-              <a:ext cx="1015203" cy="1015203"/>
+              <a:ext cx="1015205" cy="1015205"/>
             </a:xfrm>
             <a:custGeom>
               <a:avLst/>
@@ -1346,8 +1346,8 @@
           </p:nvSpPr>
           <p:spPr>
             <a:xfrm rot="10800000">
-              <a:off x="2030410" y="1015370"/>
-              <a:ext cx="1015203" cy="1015203"/>
+              <a:off x="2030411" y="1015371"/>
+              <a:ext cx="1015205" cy="1015205"/>
             </a:xfrm>
             <a:custGeom>
               <a:avLst/>
@@ -1424,7 +1424,7 @@
         <p:spPr>
           <a:xfrm>
             <a:off x="311698" y="1256049"/>
-            <a:ext cx="8520603" cy="2030703"/>
+            <a:ext cx="8520604" cy="2030703"/>
           </a:xfrm>
           <a:prstGeom prst="rect">
             <a:avLst/>
@@ -1460,7 +1460,7 @@
         <p:spPr>
           <a:xfrm>
             <a:off x="311698" y="3369224"/>
-            <a:ext cx="8520603" cy="1281902"/>
+            <a:ext cx="8520604" cy="1281903"/>
           </a:xfrm>
           <a:prstGeom prst="rect">
             <a:avLst/>
@@ -1671,10 +1671,10 @@
         </p:nvGrpSpPr>
         <p:grpSpPr>
           <a:xfrm>
-            <a:off x="6098377" y="3"/>
-            <a:ext cx="3045627" cy="2030575"/>
-            <a:chOff x="-1" y="0"/>
-            <a:chExt cx="3045626" cy="2030573"/>
+            <a:off x="6098376" y="1"/>
+            <a:ext cx="3045629" cy="2030578"/>
+            <a:chOff x="0" y="-1"/>
+            <a:chExt cx="3045627" cy="2030576"/>
           </a:xfrm>
         </p:grpSpPr>
         <p:sp>
@@ -1685,8 +1685,8 @@
           </p:nvSpPr>
           <p:spPr>
             <a:xfrm>
-              <a:off x="2030424" y="10"/>
-              <a:ext cx="1015202" cy="1015203"/>
+              <a:off x="2030425" y="9"/>
+              <a:ext cx="1015203" cy="1015206"/>
             </a:xfrm>
             <a:prstGeom prst="rect">
               <a:avLst/>
@@ -1728,8 +1728,8 @@
           </p:nvSpPr>
           <p:spPr>
             <a:xfrm flipH="1">
-              <a:off x="1015084" y="-1"/>
-              <a:ext cx="1015203" cy="1015204"/>
+              <a:off x="1015085" y="-2"/>
+              <a:ext cx="1015204" cy="1015207"/>
             </a:xfrm>
             <a:custGeom>
               <a:avLst/>
@@ -1802,8 +1802,8 @@
           </p:nvSpPr>
           <p:spPr>
             <a:xfrm flipH="1" rot="10800000">
-              <a:off x="1015209" y="102"/>
-              <a:ext cx="1015202" cy="1015203"/>
+              <a:off x="1015210" y="102"/>
+              <a:ext cx="1015203" cy="1015205"/>
             </a:xfrm>
             <a:custGeom>
               <a:avLst/>
@@ -1877,7 +1877,7 @@
           <p:spPr>
             <a:xfrm rot="10800000">
               <a:off x="-1" y="92"/>
-              <a:ext cx="1015203" cy="1015203"/>
+              <a:ext cx="1015205" cy="1015205"/>
             </a:xfrm>
             <a:custGeom>
               <a:avLst/>
@@ -1950,8 +1950,8 @@
           </p:nvSpPr>
           <p:spPr>
             <a:xfrm rot="10800000">
-              <a:off x="2030410" y="1015370"/>
-              <a:ext cx="1015203" cy="1015203"/>
+              <a:off x="2030411" y="1015371"/>
+              <a:ext cx="1015205" cy="1015205"/>
             </a:xfrm>
             <a:custGeom>
               <a:avLst/>
@@ -2027,8 +2027,8 @@
         </p:nvSpPr>
         <p:spPr>
           <a:xfrm>
-            <a:off x="598100" y="2152345"/>
-            <a:ext cx="8222100" cy="838802"/>
+            <a:off x="598100" y="2152344"/>
+            <a:ext cx="8222100" cy="838803"/>
           </a:xfrm>
           <a:prstGeom prst="rect">
             <a:avLst/>
@@ -2256,7 +2256,7 @@
         <p:spPr>
           <a:xfrm>
             <a:off x="311698" y="1229975"/>
-            <a:ext cx="3999903" cy="3339001"/>
+            <a:ext cx="3999904" cy="3339001"/>
           </a:xfrm>
           <a:prstGeom prst="rect">
             <a:avLst/>
@@ -2328,8 +2328,8 @@
         </p:nvSpPr>
         <p:spPr>
           <a:xfrm>
-            <a:off x="4832398" y="1229973"/>
-            <a:ext cx="3999903" cy="3339003"/>
+            <a:off x="4832397" y="1229972"/>
+            <a:ext cx="3999905" cy="3339005"/>
           </a:xfrm>
           <a:prstGeom prst="rect">
             <a:avLst/>
@@ -2490,7 +2490,7 @@
         <p:spPr>
           <a:xfrm>
             <a:off x="311698" y="555600"/>
-            <a:ext cx="2808003" cy="755700"/>
+            <a:ext cx="2808004" cy="755700"/>
           </a:xfrm>
           <a:prstGeom prst="rect">
             <a:avLst/>
@@ -2522,7 +2522,7 @@
         <p:spPr>
           <a:xfrm>
             <a:off x="311698" y="1465804"/>
-            <a:ext cx="2808003" cy="3103200"/>
+            <a:ext cx="2808004" cy="3103200"/>
           </a:xfrm>
           <a:prstGeom prst="rect">
             <a:avLst/>
@@ -2655,10 +2655,10 @@
         </p:nvGrpSpPr>
         <p:grpSpPr>
           <a:xfrm>
-            <a:off x="6098377" y="3"/>
-            <a:ext cx="3045627" cy="2030575"/>
-            <a:chOff x="-1" y="0"/>
-            <a:chExt cx="3045626" cy="2030573"/>
+            <a:off x="6098376" y="1"/>
+            <a:ext cx="3045629" cy="2030578"/>
+            <a:chOff x="0" y="-1"/>
+            <a:chExt cx="3045627" cy="2030576"/>
           </a:xfrm>
         </p:grpSpPr>
         <p:sp>
@@ -2669,8 +2669,8 @@
           </p:nvSpPr>
           <p:spPr>
             <a:xfrm>
-              <a:off x="2030424" y="10"/>
-              <a:ext cx="1015202" cy="1015203"/>
+              <a:off x="2030425" y="9"/>
+              <a:ext cx="1015203" cy="1015206"/>
             </a:xfrm>
             <a:prstGeom prst="rect">
               <a:avLst/>
@@ -2712,8 +2712,8 @@
           </p:nvSpPr>
           <p:spPr>
             <a:xfrm flipH="1">
-              <a:off x="1015084" y="-1"/>
-              <a:ext cx="1015203" cy="1015204"/>
+              <a:off x="1015085" y="-2"/>
+              <a:ext cx="1015204" cy="1015207"/>
             </a:xfrm>
             <a:custGeom>
               <a:avLst/>
@@ -2786,8 +2786,8 @@
           </p:nvSpPr>
           <p:spPr>
             <a:xfrm flipH="1" rot="10800000">
-              <a:off x="1015209" y="102"/>
-              <a:ext cx="1015202" cy="1015203"/>
+              <a:off x="1015210" y="102"/>
+              <a:ext cx="1015203" cy="1015205"/>
             </a:xfrm>
             <a:custGeom>
               <a:avLst/>
@@ -2861,7 +2861,7 @@
           <p:spPr>
             <a:xfrm rot="10800000">
               <a:off x="-1" y="92"/>
-              <a:ext cx="1015203" cy="1015203"/>
+              <a:ext cx="1015205" cy="1015205"/>
             </a:xfrm>
             <a:custGeom>
               <a:avLst/>
@@ -2934,8 +2934,8 @@
           </p:nvSpPr>
           <p:spPr>
             <a:xfrm rot="10800000">
-              <a:off x="2030410" y="1015370"/>
-              <a:ext cx="1015203" cy="1015203"/>
+              <a:off x="2030411" y="1015371"/>
+              <a:ext cx="1015205" cy="1015205"/>
             </a:xfrm>
             <a:custGeom>
               <a:avLst/>
@@ -3012,7 +3012,7 @@
         <p:spPr>
           <a:xfrm>
             <a:off x="490250" y="526348"/>
-            <a:ext cx="5618701" cy="4090803"/>
+            <a:ext cx="5618701" cy="4090804"/>
           </a:xfrm>
           <a:prstGeom prst="rect">
             <a:avLst/>
@@ -3093,8 +3093,8 @@
         </p:nvSpPr>
         <p:spPr>
           <a:xfrm>
-            <a:off x="4572000" y="-176"/>
-            <a:ext cx="4572000" cy="5143503"/>
+            <a:off x="4572000" y="-177"/>
+            <a:ext cx="4572000" cy="5143505"/>
           </a:xfrm>
           <a:prstGeom prst="rect">
             <a:avLst/>
@@ -3133,7 +3133,7 @@
         <p:spPr>
           <a:xfrm>
             <a:off x="5029675" y="4495500"/>
-            <a:ext cx="468302" cy="2"/>
+            <a:ext cx="468303" cy="3"/>
           </a:xfrm>
           <a:prstGeom prst="line">
             <a:avLst/>
@@ -3204,7 +3204,7 @@
         <p:txBody>
           <a:bodyPr/>
           <a:lstStyle>
-            <a:lvl1pPr marL="228600" indent="-114300" algn="ctr">
+            <a:lvl1pPr marL="114300" indent="0" algn="ctr">
               <a:lnSpc>
                 <a:spcPct val="100000"/>
               </a:lnSpc>
@@ -3214,7 +3214,7 @@
               <a:buNone/>
               <a:defRPr sz="2100"/>
             </a:lvl1pPr>
-            <a:lvl2pPr marL="228600" indent="114300" algn="ctr">
+            <a:lvl2pPr marL="114300" indent="114300" algn="ctr">
               <a:lnSpc>
                 <a:spcPct val="100000"/>
               </a:lnSpc>
@@ -3224,7 +3224,7 @@
               <a:buNone/>
               <a:defRPr sz="2100"/>
             </a:lvl2pPr>
-            <a:lvl3pPr marL="228600" indent="114300" algn="ctr">
+            <a:lvl3pPr marL="114300" indent="114300" algn="ctr">
               <a:lnSpc>
                 <a:spcPct val="100000"/>
               </a:lnSpc>
@@ -3234,7 +3234,7 @@
               <a:buNone/>
               <a:defRPr sz="2100"/>
             </a:lvl3pPr>
-            <a:lvl4pPr marL="228600" indent="114300" algn="ctr">
+            <a:lvl4pPr marL="114300" indent="114300" algn="ctr">
               <a:lnSpc>
                 <a:spcPct val="100000"/>
               </a:lnSpc>
@@ -3244,7 +3244,7 @@
               <a:buNone/>
               <a:defRPr sz="2100"/>
             </a:lvl4pPr>
-            <a:lvl5pPr marL="228600" indent="114300" algn="ctr">
+            <a:lvl5pPr marL="114300" indent="114300" algn="ctr">
               <a:lnSpc>
                 <a:spcPct val="100000"/>
               </a:lnSpc>
@@ -3371,7 +3371,7 @@
         <p:spPr>
           <a:xfrm>
             <a:off x="319499" y="4230575"/>
-            <a:ext cx="5998803" cy="598802"/>
+            <a:ext cx="5998803" cy="598803"/>
           </a:xfrm>
           <a:prstGeom prst="rect">
             <a:avLst/>
@@ -3389,28 +3389,28 @@
               <a:buFontTx/>
               <a:buNone/>
             </a:lvl1pPr>
-            <a:lvl2pPr>
+            <a:lvl2pPr marL="1233714" indent="-408213">
               <a:lnSpc>
                 <a:spcPct val="100000"/>
               </a:lnSpc>
               <a:buClrTx/>
               <a:buFontTx/>
             </a:lvl2pPr>
-            <a:lvl3pPr>
+            <a:lvl3pPr marL="1690914">
               <a:lnSpc>
                 <a:spcPct val="100000"/>
               </a:lnSpc>
               <a:buClrTx/>
               <a:buFontTx/>
             </a:lvl3pPr>
-            <a:lvl4pPr>
+            <a:lvl4pPr marL="2148114">
               <a:lnSpc>
                 <a:spcPct val="100000"/>
               </a:lnSpc>
               <a:buClrTx/>
               <a:buFontTx/>
             </a:lvl4pPr>
-            <a:lvl5pPr>
+            <a:lvl5pPr marL="2605314">
               <a:lnSpc>
                 <a:spcPct val="100000"/>
               </a:lnSpc>
@@ -3521,10 +3521,10 @@
         </p:nvGrpSpPr>
         <p:grpSpPr>
           <a:xfrm>
-            <a:off x="0" y="3903669"/>
-            <a:ext cx="9144000" cy="1239928"/>
-            <a:chOff x="0" y="0"/>
-            <a:chExt cx="9144000" cy="1239927"/>
+            <a:off x="0" y="3903668"/>
+            <a:ext cx="9144000" cy="1239930"/>
+            <a:chOff x="0" y="-1"/>
+            <a:chExt cx="9144000" cy="1239929"/>
           </a:xfrm>
         </p:grpSpPr>
         <p:sp>
@@ -3535,8 +3535,8 @@
           </p:nvSpPr>
           <p:spPr>
             <a:xfrm>
-              <a:off x="8154895" y="-1"/>
-              <a:ext cx="989102" cy="987903"/>
+              <a:off x="8154895" y="-2"/>
+              <a:ext cx="989103" cy="987905"/>
             </a:xfrm>
             <a:custGeom>
               <a:avLst/>
@@ -3609,8 +3609,8 @@
           </p:nvSpPr>
           <p:spPr>
             <a:xfrm flipH="1">
-              <a:off x="6181162" y="-1"/>
-              <a:ext cx="989103" cy="987903"/>
+              <a:off x="6181162" y="-2"/>
+              <a:ext cx="989104" cy="987905"/>
             </a:xfrm>
             <a:custGeom>
               <a:avLst/>
@@ -3683,8 +3683,8 @@
           </p:nvSpPr>
           <p:spPr>
             <a:xfrm>
-              <a:off x="7170273" y="0"/>
-              <a:ext cx="989103" cy="987902"/>
+              <a:off x="7170273" y="-1"/>
+              <a:ext cx="989104" cy="987903"/>
             </a:xfrm>
             <a:prstGeom prst="rect">
               <a:avLst/>
@@ -3726,8 +3726,8 @@
           </p:nvSpPr>
           <p:spPr>
             <a:xfrm rot="10800000">
-              <a:off x="8154757" y="11"/>
-              <a:ext cx="989102" cy="987904"/>
+              <a:off x="8154757" y="10"/>
+              <a:ext cx="989103" cy="987906"/>
             </a:xfrm>
             <a:custGeom>
               <a:avLst/>
@@ -3801,7 +3801,7 @@
           <p:spPr>
             <a:xfrm>
               <a:off x="0" y="987926"/>
-              <a:ext cx="9144000" cy="252002"/>
+              <a:ext cx="9144000" cy="252003"/>
             </a:xfrm>
             <a:prstGeom prst="rect">
               <a:avLst/>
@@ -3847,7 +3847,7 @@
         <p:spPr>
           <a:xfrm>
             <a:off x="311698" y="410000"/>
-            <a:ext cx="8520603" cy="607802"/>
+            <a:ext cx="8520604" cy="607803"/>
           </a:xfrm>
           <a:prstGeom prst="rect">
             <a:avLst/>
@@ -3862,7 +3862,7 @@
           </a:extLst>
         </p:spPr>
         <p:txBody>
-          <a:bodyPr lIns="91423" tIns="91423" rIns="91423" bIns="91423">
+          <a:bodyPr lIns="91422" tIns="91422" rIns="91422" bIns="91422">
             <a:normAutofit fontScale="100000" lnSpcReduction="0"/>
           </a:bodyPr>
           <a:lstStyle/>
@@ -3885,7 +3885,7 @@
         <p:spPr>
           <a:xfrm>
             <a:off x="311698" y="1229875"/>
-            <a:ext cx="8520603" cy="3339001"/>
+            <a:ext cx="8520604" cy="3339001"/>
           </a:xfrm>
           <a:prstGeom prst="rect">
             <a:avLst/>
@@ -3900,7 +3900,7 @@
           </a:extLst>
         </p:spPr>
         <p:txBody>
-          <a:bodyPr lIns="91423" tIns="91423" rIns="91423" bIns="91423">
+          <a:bodyPr lIns="91422" tIns="91422" rIns="91422" bIns="91422">
             <a:normAutofit fontScale="100000" lnSpcReduction="0"/>
           </a:bodyPr>
           <a:lstStyle/>
@@ -3946,8 +3946,8 @@
         </p:nvSpPr>
         <p:spPr>
           <a:xfrm>
-            <a:off x="8672320" y="4680366"/>
-            <a:ext cx="336811" cy="335249"/>
+            <a:off x="8672322" y="4680367"/>
+            <a:ext cx="336810" cy="335247"/>
           </a:xfrm>
           <a:prstGeom prst="rect">
             <a:avLst/>
@@ -3957,7 +3957,7 @@
           </a:ln>
         </p:spPr>
         <p:txBody>
-          <a:bodyPr wrap="none" lIns="91423" tIns="91423" rIns="91423" bIns="91423" anchor="ctr">
+          <a:bodyPr wrap="none" lIns="91422" tIns="91422" rIns="91422" bIns="91422" anchor="ctr">
             <a:spAutoFit/>
           </a:bodyPr>
           <a:lstStyle>
@@ -4863,8 +4863,8 @@
         </p:nvSpPr>
         <p:spPr>
           <a:xfrm>
-            <a:off x="598099" y="2571325"/>
-            <a:ext cx="3596702" cy="2409002"/>
+            <a:off x="598098" y="2571325"/>
+            <a:ext cx="3596704" cy="2409003"/>
           </a:xfrm>
           <a:prstGeom prst="rect">
             <a:avLst/>
@@ -4874,13 +4874,13 @@
           <a:bodyPr/>
           <a:lstStyle/>
           <a:p>
-            <a:pPr marL="0" indent="0"/>
+            <a:pPr marL="0"/>
             <a:r>
-              <a:t>Group Name: GGWP</a:t>
+              <a:t>Group Name: GLHF</a:t>
             </a:r>
           </a:p>
           <a:p>
-            <a:pPr marL="0" indent="0"/>
+            <a:pPr marL="0"/>
             <a:r>
               <a:t>Group Members:</a:t>
             </a:r>
@@ -4948,7 +4948,7 @@
         <p:spPr>
           <a:xfrm>
             <a:off x="6312198" y="4286425"/>
-            <a:ext cx="2508002" cy="693902"/>
+            <a:ext cx="2508003" cy="693903"/>
           </a:xfrm>
           <a:prstGeom prst="rect">
             <a:avLst/>
@@ -4963,7 +4963,7 @@
           </a:extLst>
         </p:spPr>
         <p:txBody>
-          <a:bodyPr lIns="91423" tIns="91423" rIns="91423" bIns="91423">
+          <a:bodyPr lIns="91422" tIns="91422" rIns="91422" bIns="91422">
             <a:normAutofit fontScale="100000" lnSpcReduction="0"/>
           </a:bodyPr>
           <a:lstStyle>
@@ -5015,9 +5015,9 @@
       </p:grpSpPr>
       <p:pic>
         <p:nvPicPr>
-          <p:cNvPr id="144" name="ense470CurrentVSM.png" descr="ense470CurrentVSM.png"/>
+          <p:cNvPr id="144" name="Image" descr="Image"/>
           <p:cNvPicPr>
-            <a:picLocks noChangeAspect="1"/>
+            <a:picLocks noChangeAspect="0"/>
           </p:cNvPicPr>
           <p:nvPr/>
         </p:nvPicPr>
@@ -5031,8 +5031,8 @@
         </p:blipFill>
         <p:spPr>
           <a:xfrm>
-            <a:off x="53423" y="-5119"/>
-            <a:ext cx="9144002" cy="5153737"/>
+            <a:off x="-25107" y="7914"/>
+            <a:ext cx="9144001" cy="5127672"/>
           </a:xfrm>
           <a:prstGeom prst="rect">
             <a:avLst/>
@@ -5070,7 +5070,7 @@
       </p:grpSpPr>
       <p:pic>
         <p:nvPicPr>
-          <p:cNvPr id="146" name="ense470CurrentVSM.png" descr="ense470CurrentVSM.png"/>
+          <p:cNvPr id="146" name="Image" descr="Image"/>
           <p:cNvPicPr>
             <a:picLocks noChangeAspect="0"/>
           </p:cNvPicPr>
@@ -5086,8 +5086,8 @@
         </p:blipFill>
         <p:spPr>
           <a:xfrm>
-            <a:off x="-31404" y="-29700"/>
-            <a:ext cx="9206808" cy="5202900"/>
+            <a:off x="4216" y="0"/>
+            <a:ext cx="9135568" cy="5143501"/>
           </a:xfrm>
           <a:prstGeom prst="rect">
             <a:avLst/>
@@ -5134,7 +5134,7 @@
         <p:spPr>
           <a:xfrm>
             <a:off x="311699" y="410000"/>
-            <a:ext cx="8520602" cy="607802"/>
+            <a:ext cx="8520602" cy="607803"/>
           </a:xfrm>
           <a:prstGeom prst="rect">
             <a:avLst/>
@@ -5165,8 +5165,8 @@
         </p:nvSpPr>
         <p:spPr>
           <a:xfrm>
-            <a:off x="311699" y="893791"/>
-            <a:ext cx="8520602" cy="3675084"/>
+            <a:off x="311699" y="893790"/>
+            <a:ext cx="8520602" cy="3675085"/>
           </a:xfrm>
           <a:prstGeom prst="rect">
             <a:avLst/>
@@ -5345,14 +5345,14 @@
     </a:clrScheme>
     <a:fontScheme name="Geometric">
       <a:majorFont>
+        <a:latin typeface="Helvetica"/>
+        <a:ea typeface="Helvetica"/>
+        <a:cs typeface="Helvetica"/>
+      </a:majorFont>
+      <a:minorFont>
         <a:latin typeface="Helvetica Neue"/>
         <a:ea typeface="Helvetica Neue"/>
         <a:cs typeface="Helvetica Neue"/>
-      </a:majorFont>
-      <a:minorFont>
-        <a:latin typeface="Helvetica"/>
-        <a:ea typeface="Helvetica"/>
-        <a:cs typeface="Helvetica"/>
       </a:minorFont>
     </a:fontScheme>
     <a:fmtScheme name="Geometric">
@@ -5557,9 +5557,9 @@
             </a:solidFill>
             <a:effectLst/>
             <a:uFillTx/>
-            <a:latin typeface="+mn-lt"/>
-            <a:ea typeface="+mn-ea"/>
-            <a:cs typeface="+mn-cs"/>
+            <a:latin typeface="+mj-lt"/>
+            <a:ea typeface="+mj-ea"/>
+            <a:cs typeface="+mj-cs"/>
             <a:sym typeface="Helvetica"/>
           </a:defRPr>
         </a:defPPr>
@@ -6134,9 +6134,9 @@
             </a:solidFill>
             <a:effectLst/>
             <a:uFillTx/>
-            <a:latin typeface="+mn-lt"/>
-            <a:ea typeface="+mn-ea"/>
-            <a:cs typeface="+mn-cs"/>
+            <a:latin typeface="+mj-lt"/>
+            <a:ea typeface="+mj-ea"/>
+            <a:cs typeface="+mj-cs"/>
             <a:sym typeface="Helvetica"/>
           </a:defRPr>
         </a:defPPr>
@@ -6429,14 +6429,14 @@
     </a:clrScheme>
     <a:fontScheme name="Geometric">
       <a:majorFont>
+        <a:latin typeface="Helvetica"/>
+        <a:ea typeface="Helvetica"/>
+        <a:cs typeface="Helvetica"/>
+      </a:majorFont>
+      <a:minorFont>
         <a:latin typeface="Helvetica Neue"/>
         <a:ea typeface="Helvetica Neue"/>
         <a:cs typeface="Helvetica Neue"/>
-      </a:majorFont>
-      <a:minorFont>
-        <a:latin typeface="Helvetica"/>
-        <a:ea typeface="Helvetica"/>
-        <a:cs typeface="Helvetica"/>
       </a:minorFont>
     </a:fontScheme>
     <a:fmtScheme name="Geometric">
@@ -6641,9 +6641,9 @@
             </a:solidFill>
             <a:effectLst/>
             <a:uFillTx/>
-            <a:latin typeface="+mn-lt"/>
-            <a:ea typeface="+mn-ea"/>
-            <a:cs typeface="+mn-cs"/>
+            <a:latin typeface="+mj-lt"/>
+            <a:ea typeface="+mj-ea"/>
+            <a:cs typeface="+mj-cs"/>
             <a:sym typeface="Helvetica"/>
           </a:defRPr>
         </a:defPPr>
@@ -7218,9 +7218,9 @@
             </a:solidFill>
             <a:effectLst/>
             <a:uFillTx/>
-            <a:latin typeface="+mn-lt"/>
-            <a:ea typeface="+mn-ea"/>
-            <a:cs typeface="+mn-cs"/>
+            <a:latin typeface="+mj-lt"/>
+            <a:ea typeface="+mj-ea"/>
+            <a:cs typeface="+mj-cs"/>
             <a:sym typeface="Helvetica"/>
           </a:defRPr>
         </a:defPPr>

</xml_diff>